<commit_message>
addition of direct interaction of gammas H and FV
</commit_message>
<xml_diff>
--- a/relatedocuments/Complexity.pptx
+++ b/relatedocuments/Complexity.pptx
@@ -5,7 +5,7 @@
     <p:sldMasterId id="2147483648" r:id="rId1"/>
   </p:sldMasterIdLst>
   <p:notesMasterIdLst>
-    <p:notesMasterId r:id="rId15"/>
+    <p:notesMasterId r:id="rId17"/>
   </p:notesMasterIdLst>
   <p:sldIdLst>
     <p:sldId id="256" r:id="rId2"/>
@@ -18,9 +18,11 @@
     <p:sldId id="398" r:id="rId9"/>
     <p:sldId id="395" r:id="rId10"/>
     <p:sldId id="396" r:id="rId11"/>
-    <p:sldId id="388" r:id="rId12"/>
-    <p:sldId id="390" r:id="rId13"/>
-    <p:sldId id="389" r:id="rId14"/>
+    <p:sldId id="399" r:id="rId12"/>
+    <p:sldId id="400" r:id="rId13"/>
+    <p:sldId id="388" r:id="rId14"/>
+    <p:sldId id="390" r:id="rId15"/>
+    <p:sldId id="389" r:id="rId16"/>
   </p:sldIdLst>
   <p:sldSz cx="12192000" cy="6858000"/>
   <p:notesSz cx="6858000" cy="9144000"/>
@@ -236,7 +238,7 @@
           <a:p>
             <a:fld id="{4F209E23-3A92-3C4E-A656-FEE5CB8A677A}" type="datetimeFigureOut">
               <a:rPr lang="en-GB" smtClean="0"/>
-              <a:t>02/11/2021</a:t>
+              <a:t>15/11/2021</a:t>
             </a:fld>
             <a:endParaRPr lang="en-GB"/>
           </a:p>
@@ -775,7 +777,7 @@
           <a:p>
             <a:fld id="{62DC3E3D-696B-364E-849F-35BD76525D0B}" type="datetimeFigureOut">
               <a:rPr lang="en-GB" smtClean="0"/>
-              <a:t>02/11/2021</a:t>
+              <a:t>15/11/2021</a:t>
             </a:fld>
             <a:endParaRPr lang="en-GB"/>
           </a:p>
@@ -973,7 +975,7 @@
           <a:p>
             <a:fld id="{62DC3E3D-696B-364E-849F-35BD76525D0B}" type="datetimeFigureOut">
               <a:rPr lang="en-GB" smtClean="0"/>
-              <a:t>02/11/2021</a:t>
+              <a:t>15/11/2021</a:t>
             </a:fld>
             <a:endParaRPr lang="en-GB"/>
           </a:p>
@@ -1181,7 +1183,7 @@
           <a:p>
             <a:fld id="{62DC3E3D-696B-364E-849F-35BD76525D0B}" type="datetimeFigureOut">
               <a:rPr lang="en-GB" smtClean="0"/>
-              <a:t>02/11/2021</a:t>
+              <a:t>15/11/2021</a:t>
             </a:fld>
             <a:endParaRPr lang="en-GB"/>
           </a:p>
@@ -1738,7 +1740,7 @@
           <a:p>
             <a:fld id="{62DC3E3D-696B-364E-849F-35BD76525D0B}" type="datetimeFigureOut">
               <a:rPr lang="en-GB" smtClean="0"/>
-              <a:t>02/11/2021</a:t>
+              <a:t>15/11/2021</a:t>
             </a:fld>
             <a:endParaRPr lang="en-GB"/>
           </a:p>
@@ -2013,7 +2015,7 @@
           <a:p>
             <a:fld id="{62DC3E3D-696B-364E-849F-35BD76525D0B}" type="datetimeFigureOut">
               <a:rPr lang="en-GB" smtClean="0"/>
-              <a:t>02/11/2021</a:t>
+              <a:t>15/11/2021</a:t>
             </a:fld>
             <a:endParaRPr lang="en-GB"/>
           </a:p>
@@ -2278,7 +2280,7 @@
           <a:p>
             <a:fld id="{62DC3E3D-696B-364E-849F-35BD76525D0B}" type="datetimeFigureOut">
               <a:rPr lang="en-GB" smtClean="0"/>
-              <a:t>02/11/2021</a:t>
+              <a:t>15/11/2021</a:t>
             </a:fld>
             <a:endParaRPr lang="en-GB"/>
           </a:p>
@@ -2690,7 +2692,7 @@
           <a:p>
             <a:fld id="{62DC3E3D-696B-364E-849F-35BD76525D0B}" type="datetimeFigureOut">
               <a:rPr lang="en-GB" smtClean="0"/>
-              <a:t>02/11/2021</a:t>
+              <a:t>15/11/2021</a:t>
             </a:fld>
             <a:endParaRPr lang="en-GB"/>
           </a:p>
@@ -2831,7 +2833,7 @@
           <a:p>
             <a:fld id="{62DC3E3D-696B-364E-849F-35BD76525D0B}" type="datetimeFigureOut">
               <a:rPr lang="en-GB" smtClean="0"/>
-              <a:t>02/11/2021</a:t>
+              <a:t>15/11/2021</a:t>
             </a:fld>
             <a:endParaRPr lang="en-GB"/>
           </a:p>
@@ -2944,7 +2946,7 @@
           <a:p>
             <a:fld id="{62DC3E3D-696B-364E-849F-35BD76525D0B}" type="datetimeFigureOut">
               <a:rPr lang="en-GB" smtClean="0"/>
-              <a:t>02/11/2021</a:t>
+              <a:t>15/11/2021</a:t>
             </a:fld>
             <a:endParaRPr lang="en-GB"/>
           </a:p>
@@ -3255,7 +3257,7 @@
           <a:p>
             <a:fld id="{62DC3E3D-696B-364E-849F-35BD76525D0B}" type="datetimeFigureOut">
               <a:rPr lang="en-GB" smtClean="0"/>
-              <a:t>02/11/2021</a:t>
+              <a:t>15/11/2021</a:t>
             </a:fld>
             <a:endParaRPr lang="en-GB"/>
           </a:p>
@@ -3543,7 +3545,7 @@
           <a:p>
             <a:fld id="{62DC3E3D-696B-364E-849F-35BD76525D0B}" type="datetimeFigureOut">
               <a:rPr lang="en-GB" smtClean="0"/>
-              <a:t>02/11/2021</a:t>
+              <a:t>15/11/2021</a:t>
             </a:fld>
             <a:endParaRPr lang="en-GB"/>
           </a:p>
@@ -3784,7 +3786,7 @@
           <a:p>
             <a:fld id="{62DC3E3D-696B-364E-849F-35BD76525D0B}" type="datetimeFigureOut">
               <a:rPr lang="en-GB" smtClean="0"/>
-              <a:t>02/11/2021</a:t>
+              <a:t>15/11/2021</a:t>
             </a:fld>
             <a:endParaRPr lang="en-GB"/>
           </a:p>
@@ -4804,8 +4806,8 @@
           </a:p>
         </p:txBody>
       </p:sp>
-      <mc:AlternateContent xmlns:mc="http://schemas.openxmlformats.org/markup-compatibility/2006">
-        <mc:Choice xmlns:a14="http://schemas.microsoft.com/office/drawing/2010/main" Requires="a14">
+      <mc:AlternateContent xmlns:mc="http://schemas.openxmlformats.org/markup-compatibility/2006" xmlns:a14="http://schemas.microsoft.com/office/drawing/2010/main">
+        <mc:Choice Requires="a14">
           <p:sp>
             <p:nvSpPr>
               <p:cNvPr id="6" name="TextBox 5">
@@ -4948,25 +4950,7 @@
                               </a:solidFill>
                               <a:latin typeface="Cambria Math" panose="02040503050406030204" pitchFamily="18" charset="0"/>
                             </a:rPr>
-                            <m:t>[</m:t>
-                          </m:r>
-                          <m:r>
-                            <a:rPr lang="fr-FR" b="0" i="1" smtClean="0">
-                              <a:solidFill>
-                                <a:schemeClr val="accent6"/>
-                              </a:solidFill>
-                              <a:latin typeface="Cambria Math" panose="02040503050406030204" pitchFamily="18" charset="0"/>
-                            </a:rPr>
-                            <m:t> </m:t>
-                          </m:r>
-                          <m:r>
-                            <a:rPr lang="fr-FR" b="0" i="1" smtClean="0">
-                              <a:solidFill>
-                                <a:schemeClr val="accent6"/>
-                              </a:solidFill>
-                              <a:latin typeface="Cambria Math" panose="02040503050406030204" pitchFamily="18" charset="0"/>
-                            </a:rPr>
-                            <m:t>]</m:t>
+                            <m:t>[ ]</m:t>
                           </m:r>
                         </m:e>
                       </m:mr>
@@ -4984,13 +4968,7 @@
                             <a:rPr lang="fr-FR" b="0" i="1" smtClean="0">
                               <a:latin typeface="Cambria Math" panose="02040503050406030204" pitchFamily="18" charset="0"/>
                             </a:rPr>
-                            <m:t> </m:t>
-                          </m:r>
-                          <m:r>
-                            <a:rPr lang="fr-FR" b="0" i="1" smtClean="0">
-                              <a:latin typeface="Cambria Math" panose="02040503050406030204" pitchFamily="18" charset="0"/>
-                            </a:rPr>
-                            <m:t>0</m:t>
+                            <m:t> 0</m:t>
                           </m:r>
                         </m:e>
                         <m:e>
@@ -5019,29 +4997,7 @@
                               </a:solidFill>
                               <a:latin typeface="Cambria Math" panose="02040503050406030204" pitchFamily="18" charset="0"/>
                             </a:rPr>
-                            <m:t>[</m:t>
-                          </m:r>
-                          <m:r>
-                            <a:rPr lang="fr-FR" b="0" i="1" smtClean="0">
-                              <a:solidFill>
-                                <a:schemeClr val="accent6">
-                                  <a:lumMod val="50000"/>
-                                </a:schemeClr>
-                              </a:solidFill>
-                              <a:latin typeface="Cambria Math" panose="02040503050406030204" pitchFamily="18" charset="0"/>
-                            </a:rPr>
-                            <m:t> </m:t>
-                          </m:r>
-                          <m:r>
-                            <a:rPr lang="fr-FR" b="0" i="1" smtClean="0">
-                              <a:solidFill>
-                                <a:schemeClr val="accent6">
-                                  <a:lumMod val="50000"/>
-                                </a:schemeClr>
-                              </a:solidFill>
-                              <a:latin typeface="Cambria Math" panose="02040503050406030204" pitchFamily="18" charset="0"/>
-                            </a:rPr>
-                            <m:t>]</m:t>
+                            <m:t>[ ]</m:t>
                           </m:r>
                         </m:e>
                       </m:mr>
@@ -5059,13 +5015,7 @@
                             <a:rPr lang="fr-FR" b="0" i="1" smtClean="0">
                               <a:latin typeface="Cambria Math" panose="02040503050406030204" pitchFamily="18" charset="0"/>
                             </a:rPr>
-                            <m:t> </m:t>
-                          </m:r>
-                          <m:r>
-                            <a:rPr lang="fr-FR" b="0" i="1" smtClean="0">
-                              <a:latin typeface="Cambria Math" panose="02040503050406030204" pitchFamily="18" charset="0"/>
-                            </a:rPr>
-                            <m:t>0</m:t>
+                            <m:t> 0</m:t>
                           </m:r>
                         </m:e>
                         <m:e>
@@ -5073,13 +5023,7 @@
                             <a:rPr lang="fr-FR" b="0" i="1" smtClean="0">
                               <a:latin typeface="Cambria Math" panose="02040503050406030204" pitchFamily="18" charset="0"/>
                             </a:rPr>
-                            <m:t> </m:t>
-                          </m:r>
-                          <m:r>
-                            <a:rPr lang="fr-FR" b="0" i="1" smtClean="0">
-                              <a:latin typeface="Cambria Math" panose="02040503050406030204" pitchFamily="18" charset="0"/>
-                            </a:rPr>
-                            <m:t>10</m:t>
+                            <m:t> 10</m:t>
                           </m:r>
                         </m:e>
                         <m:e>
@@ -5385,7 +5329,7 @@
             </p:txBody>
           </p:sp>
         </mc:Choice>
-        <mc:Fallback>
+        <mc:Fallback xmlns="">
           <p:sp>
             <p:nvSpPr>
               <p:cNvPr id="6" name="TextBox 5">
@@ -5430,8 +5374,8 @@
           </p:sp>
         </mc:Fallback>
       </mc:AlternateContent>
-      <mc:AlternateContent xmlns:mc="http://schemas.openxmlformats.org/markup-compatibility/2006">
-        <mc:Choice xmlns:a14="http://schemas.microsoft.com/office/drawing/2010/main" Requires="a14">
+      <mc:AlternateContent xmlns:mc="http://schemas.openxmlformats.org/markup-compatibility/2006" xmlns:a14="http://schemas.microsoft.com/office/drawing/2010/main">
+        <mc:Choice Requires="a14">
           <p:sp>
             <p:nvSpPr>
               <p:cNvPr id="8" name="TextBox 7">
@@ -6816,7 +6760,7 @@
             </p:txBody>
           </p:sp>
         </mc:Choice>
-        <mc:Fallback>
+        <mc:Fallback xmlns="">
           <p:sp>
             <p:nvSpPr>
               <p:cNvPr id="8" name="TextBox 7">
@@ -6861,8 +6805,8 @@
           </p:sp>
         </mc:Fallback>
       </mc:AlternateContent>
-      <mc:AlternateContent xmlns:mc="http://schemas.openxmlformats.org/markup-compatibility/2006">
-        <mc:Choice xmlns:a14="http://schemas.microsoft.com/office/drawing/2010/main" Requires="a14">
+      <mc:AlternateContent xmlns:mc="http://schemas.openxmlformats.org/markup-compatibility/2006" xmlns:a14="http://schemas.microsoft.com/office/drawing/2010/main">
+        <mc:Choice Requires="a14">
           <p:sp>
             <p:nvSpPr>
               <p:cNvPr id="11" name="TextBox 10">
@@ -7009,7 +6953,17 @@
                                 <a:latin typeface="Cambria Math" panose="02040503050406030204" pitchFamily="18" charset="0"/>
                                 <a:ea typeface="Cambria Math" panose="02040503050406030204" pitchFamily="18" charset="0"/>
                               </a:rPr>
-                              <m:t>∗0</m:t>
+                              <m:t>∗</m:t>
+                            </m:r>
+                            <m:r>
+                              <a:rPr lang="fr-FR" sz="1800" b="0" i="1" smtClean="0">
+                                <a:solidFill>
+                                  <a:schemeClr val="accent6"/>
+                                </a:solidFill>
+                                <a:latin typeface="Cambria Math" panose="02040503050406030204" pitchFamily="18" charset="0"/>
+                                <a:ea typeface="Cambria Math" panose="02040503050406030204" pitchFamily="18" charset="0"/>
+                              </a:rPr>
+                              <m:t>0</m:t>
                             </m:r>
                           </m:e>
                           <m:e>
@@ -7123,7 +7077,17 @@
                                 <a:latin typeface="Cambria Math" panose="02040503050406030204" pitchFamily="18" charset="0"/>
                                 <a:ea typeface="Cambria Math" panose="02040503050406030204" pitchFamily="18" charset="0"/>
                               </a:rPr>
-                              <m:t>∗0+ </m:t>
+                              <m:t>∗</m:t>
+                            </m:r>
+                            <m:r>
+                              <a:rPr lang="fr-FR" sz="1800" b="0" i="1" smtClean="0">
+                                <a:solidFill>
+                                  <a:schemeClr val="accent6"/>
+                                </a:solidFill>
+                                <a:latin typeface="Cambria Math" panose="02040503050406030204" pitchFamily="18" charset="0"/>
+                                <a:ea typeface="Cambria Math" panose="02040503050406030204" pitchFamily="18" charset="0"/>
+                              </a:rPr>
+                              <m:t>0+ </m:t>
                             </m:r>
                           </m:e>
                           <m:e>
@@ -7407,7 +7371,19 @@
                                 <a:latin typeface="Cambria Math" panose="02040503050406030204" pitchFamily="18" charset="0"/>
                                 <a:ea typeface="Cambria Math" panose="02040503050406030204" pitchFamily="18" charset="0"/>
                               </a:rPr>
-                              <m:t>∗0</m:t>
+                              <m:t>∗</m:t>
+                            </m:r>
+                            <m:r>
+                              <a:rPr lang="fr-FR" b="0" i="1" smtClean="0">
+                                <a:solidFill>
+                                  <a:schemeClr val="accent6">
+                                    <a:lumMod val="50000"/>
+                                  </a:schemeClr>
+                                </a:solidFill>
+                                <a:latin typeface="Cambria Math" panose="02040503050406030204" pitchFamily="18" charset="0"/>
+                                <a:ea typeface="Cambria Math" panose="02040503050406030204" pitchFamily="18" charset="0"/>
+                              </a:rPr>
+                              <m:t>0</m:t>
                             </m:r>
                           </m:e>
                           <m:e>
@@ -7539,7 +7515,19 @@
                                 <a:latin typeface="Cambria Math" panose="02040503050406030204" pitchFamily="18" charset="0"/>
                                 <a:ea typeface="Cambria Math" panose="02040503050406030204" pitchFamily="18" charset="0"/>
                               </a:rPr>
-                              <m:t>∗4</m:t>
+                              <m:t>∗</m:t>
+                            </m:r>
+                            <m:r>
+                              <a:rPr lang="fr-FR" b="0" i="1" smtClean="0">
+                                <a:solidFill>
+                                  <a:schemeClr val="accent6">
+                                    <a:lumMod val="50000"/>
+                                  </a:schemeClr>
+                                </a:solidFill>
+                                <a:latin typeface="Cambria Math" panose="02040503050406030204" pitchFamily="18" charset="0"/>
+                                <a:ea typeface="Cambria Math" panose="02040503050406030204" pitchFamily="18" charset="0"/>
+                              </a:rPr>
+                              <m:t>4</m:t>
                             </m:r>
                           </m:e>
                           <m:e>
@@ -7842,7 +7830,17 @@
                                 <a:latin typeface="Cambria Math" panose="02040503050406030204" pitchFamily="18" charset="0"/>
                                 <a:ea typeface="Cambria Math" panose="02040503050406030204" pitchFamily="18" charset="0"/>
                               </a:rPr>
-                              <m:t>∗0</m:t>
+                              <m:t>∗</m:t>
+                            </m:r>
+                            <m:r>
+                              <a:rPr lang="fr-FR" b="0" i="1" smtClean="0">
+                                <a:solidFill>
+                                  <a:srgbClr val="7030A0"/>
+                                </a:solidFill>
+                                <a:latin typeface="Cambria Math" panose="02040503050406030204" pitchFamily="18" charset="0"/>
+                                <a:ea typeface="Cambria Math" panose="02040503050406030204" pitchFamily="18" charset="0"/>
+                              </a:rPr>
+                              <m:t>0</m:t>
                             </m:r>
                           </m:e>
                           <m:e>
@@ -7966,7 +7964,17 @@
                                 <a:latin typeface="Cambria Math" panose="02040503050406030204" pitchFamily="18" charset="0"/>
                                 <a:ea typeface="Cambria Math" panose="02040503050406030204" pitchFamily="18" charset="0"/>
                               </a:rPr>
-                              <m:t>∗0</m:t>
+                              <m:t>∗</m:t>
+                            </m:r>
+                            <m:r>
+                              <a:rPr lang="fr-FR" b="0" i="1" smtClean="0">
+                                <a:solidFill>
+                                  <a:srgbClr val="7030A0"/>
+                                </a:solidFill>
+                                <a:latin typeface="Cambria Math" panose="02040503050406030204" pitchFamily="18" charset="0"/>
+                                <a:ea typeface="Cambria Math" panose="02040503050406030204" pitchFamily="18" charset="0"/>
+                              </a:rPr>
+                              <m:t>0</m:t>
                             </m:r>
                           </m:e>
                           <m:e>
@@ -8112,7 +8120,7 @@
             </p:txBody>
           </p:sp>
         </mc:Choice>
-        <mc:Fallback>
+        <mc:Fallback xmlns="">
           <p:sp>
             <p:nvSpPr>
               <p:cNvPr id="11" name="TextBox 10">
@@ -8157,14 +8165,171 @@
           </p:sp>
         </mc:Fallback>
       </mc:AlternateContent>
+      <p:sp>
+        <p:nvSpPr>
+          <p:cNvPr id="10" name="TextBox 9">
+            <a:extLst>
+              <a:ext uri="{FF2B5EF4-FFF2-40B4-BE49-F238E27FC236}">
+                <a16:creationId xmlns:a16="http://schemas.microsoft.com/office/drawing/2014/main" id="{AAA77A82-A5C1-7D4B-BF90-1DA590CA89CC}"/>
+              </a:ext>
+            </a:extLst>
+          </p:cNvPr>
+          <p:cNvSpPr txBox="1"/>
+          <p:nvPr/>
+        </p:nvSpPr>
+        <p:spPr>
+          <a:xfrm>
+            <a:off x="3933824" y="5506769"/>
+            <a:ext cx="3365897" cy="369332"/>
+          </a:xfrm>
+          <a:prstGeom prst="rect">
+            <a:avLst/>
+          </a:prstGeom>
+          <a:noFill/>
+        </p:spPr>
+        <p:txBody>
+          <a:bodyPr wrap="square">
+            <a:spAutoFit/>
+          </a:bodyPr>
+          <a:lstStyle/>
+          <a:p>
+            <a:pPr/>
+            <a:r>
+              <a:rPr lang="en-GB" b="1" dirty="0"/>
+              <a:t>HOIs of plants for focal </a:t>
+            </a:r>
+            <a:r>
+              <a:rPr lang="en-GB" b="1" dirty="0" err="1"/>
+              <a:t>i</a:t>
+            </a:r>
+            <a:r>
+              <a:rPr lang="en-GB" b="1" dirty="0"/>
+              <a:t>, </a:t>
+            </a:r>
+            <a:r>
+              <a:rPr lang="en-GB" b="1" dirty="0" err="1"/>
+              <a:t>obs</a:t>
+            </a:r>
+            <a:r>
+              <a:rPr lang="en-GB" b="1" dirty="0"/>
+              <a:t> 1 =&gt;  </a:t>
+            </a:r>
+          </a:p>
+        </p:txBody>
+      </p:sp>
+    </p:spTree>
+    <p:extLst>
+      <p:ext uri="{BB962C8B-B14F-4D97-AF65-F5344CB8AC3E}">
+        <p14:creationId xmlns:p14="http://schemas.microsoft.com/office/powerpoint/2010/main" val="1111446431"/>
+      </p:ext>
+    </p:extLst>
+  </p:cSld>
+  <p:clrMapOvr>
+    <a:masterClrMapping/>
+  </p:clrMapOvr>
+</p:sld>
+</file>
+
+<file path=ppt/slides/slide11.xml><?xml version="1.0" encoding="utf-8"?>
+<p:sld xmlns:a="http://schemas.openxmlformats.org/drawingml/2006/main" xmlns:r="http://schemas.openxmlformats.org/officeDocument/2006/relationships" xmlns:p="http://schemas.openxmlformats.org/presentationml/2006/main">
+  <p:cSld>
+    <p:spTree>
+      <p:nvGrpSpPr>
+        <p:cNvPr id="1" name=""/>
+        <p:cNvGrpSpPr/>
+        <p:nvPr/>
+      </p:nvGrpSpPr>
+      <p:grpSpPr>
+        <a:xfrm>
+          <a:off x="0" y="0"/>
+          <a:ext cx="0" cy="0"/>
+          <a:chOff x="0" y="0"/>
+          <a:chExt cx="0" cy="0"/>
+        </a:xfrm>
+      </p:grpSpPr>
+      <p:sp>
+        <p:nvSpPr>
+          <p:cNvPr id="2" name="Title 1">
+            <a:extLst>
+              <a:ext uri="{FF2B5EF4-FFF2-40B4-BE49-F238E27FC236}">
+                <a16:creationId xmlns:a16="http://schemas.microsoft.com/office/drawing/2014/main" id="{4A8801C4-7BC7-F64E-BC9E-DB9A7D14A5CF}"/>
+              </a:ext>
+            </a:extLst>
+          </p:cNvPr>
+          <p:cNvSpPr>
+            <a:spLocks noGrp="1"/>
+          </p:cNvSpPr>
+          <p:nvPr>
+            <p:ph type="title"/>
+          </p:nvPr>
+        </p:nvSpPr>
+        <p:spPr>
+          <a:xfrm>
+            <a:off x="415600" y="54670"/>
+            <a:ext cx="11360800" cy="763600"/>
+          </a:xfrm>
+        </p:spPr>
+        <p:txBody>
+          <a:bodyPr>
+            <a:normAutofit fontScale="90000"/>
+          </a:bodyPr>
+          <a:lstStyle/>
+          <a:p>
+            <a:r>
+              <a:rPr lang="fr-FR" dirty="0"/>
+              <a:t>How to </a:t>
+            </a:r>
+            <a:r>
+              <a:rPr lang="fr-FR" dirty="0" err="1"/>
+              <a:t>add</a:t>
+            </a:r>
+            <a:r>
+              <a:rPr lang="fr-FR" dirty="0"/>
+              <a:t> </a:t>
+            </a:r>
+            <a:r>
+              <a:rPr lang="fr-FR" dirty="0" err="1"/>
+              <a:t>HOIs</a:t>
+            </a:r>
+            <a:r>
+              <a:rPr lang="fr-FR" dirty="0"/>
+              <a:t> for </a:t>
+            </a:r>
+            <a:r>
+              <a:rPr lang="fr-FR" dirty="0" err="1"/>
+              <a:t>higher</a:t>
+            </a:r>
+            <a:r>
+              <a:rPr lang="fr-FR" dirty="0"/>
+              <a:t> </a:t>
+            </a:r>
+            <a:r>
+              <a:rPr lang="fr-FR" dirty="0" err="1"/>
+              <a:t>trophic</a:t>
+            </a:r>
+            <a:r>
+              <a:rPr lang="fr-FR" dirty="0"/>
+              <a:t> </a:t>
+            </a:r>
+            <a:r>
+              <a:rPr lang="fr-FR" dirty="0" err="1"/>
+              <a:t>level</a:t>
+            </a:r>
+            <a:r>
+              <a:rPr lang="fr-FR" dirty="0"/>
+              <a:t> ? </a:t>
+            </a:r>
+          </a:p>
+        </p:txBody>
+      </p:sp>
       <mc:AlternateContent xmlns:mc="http://schemas.openxmlformats.org/markup-compatibility/2006">
         <mc:Choice xmlns:a14="http://schemas.microsoft.com/office/drawing/2010/main" Requires="a14">
           <p:sp>
             <p:nvSpPr>
-              <p:cNvPr id="14" name="TextBox 13">
+              <p:cNvPr id="3" name="TextBox 2">
                 <a:extLst>
                   <a:ext uri="{FF2B5EF4-FFF2-40B4-BE49-F238E27FC236}">
-                    <a16:creationId xmlns:a16="http://schemas.microsoft.com/office/drawing/2014/main" id="{FB268263-6621-A84C-A9AB-BCAA414D18CE}"/>
+                    <a16:creationId xmlns:a16="http://schemas.microsoft.com/office/drawing/2014/main" id="{15A293A7-B477-E449-9235-A5558781042E}"/>
                   </a:ext>
                 </a:extLst>
               </p:cNvPr>
@@ -8173,8 +8338,8 @@
             </p:nvSpPr>
             <p:spPr>
               <a:xfrm>
-                <a:off x="3492103" y="5575665"/>
-                <a:ext cx="4207669" cy="369332"/>
+                <a:off x="415600" y="818270"/>
+                <a:ext cx="11522400" cy="2160591"/>
               </a:xfrm>
               <a:prstGeom prst="rect">
                 <a:avLst/>
@@ -8182,46 +8347,363 @@
               <a:noFill/>
             </p:spPr>
             <p:txBody>
-              <a:bodyPr wrap="square">
+              <a:bodyPr wrap="square" lIns="0" tIns="0" rIns="0" bIns="0" rtlCol="0">
                 <a:spAutoFit/>
               </a:bodyPr>
               <a:lstStyle/>
               <a:p>
-                <a:pPr/>
+                <a:r>
+                  <a:rPr lang="fr-FR" sz="2400" b="0" dirty="0"/>
+                  <a:t>For a focal </a:t>
+                </a:r>
+                <a:r>
+                  <a:rPr lang="fr-FR" sz="2400" b="0" dirty="0" err="1"/>
+                  <a:t>species</a:t>
+                </a:r>
+                <a:r>
+                  <a:rPr lang="fr-FR" sz="2400" b="0" dirty="0"/>
+                  <a:t> i</a:t>
+                </a:r>
+              </a:p>
+              <a:p>
+                <a:r>
+                  <a:rPr lang="fr-FR" sz="2400" b="0" dirty="0"/>
+                  <a:t> </a:t>
+                </a:r>
+              </a:p>
+              <a:p>
+                <a:r>
+                  <a:rPr lang="fr-FR" sz="2400" b="0" dirty="0" err="1"/>
+                  <a:t>We</a:t>
+                </a:r>
+                <a:r>
+                  <a:rPr lang="fr-FR" sz="2400" b="0" dirty="0"/>
+                  <a:t> have a matrix of </a:t>
+                </a:r>
+                <a:r>
+                  <a:rPr lang="fr-FR" sz="2400" b="0" dirty="0" err="1"/>
+                  <a:t>seed</a:t>
+                </a:r>
+                <a:r>
+                  <a:rPr lang="fr-FR" sz="2400" b="0" dirty="0"/>
+                  <a:t>/</a:t>
+                </a:r>
+                <a:r>
+                  <a:rPr lang="fr-FR" sz="2400" b="0" dirty="0" err="1"/>
+                  <a:t>abundance</a:t>
+                </a:r>
+                <a:r>
+                  <a:rPr lang="fr-FR" sz="2400" dirty="0"/>
+                  <a:t> per observations</a:t>
+                </a:r>
+              </a:p>
+              <a:p>
+                <a:r>
+                  <a:rPr lang="fr-FR" sz="2400" b="0" dirty="0"/>
+                  <a:t> </a:t>
+                </a:r>
                 <a14:m>
-                  <m:oMathPara xmlns:m="http://schemas.openxmlformats.org/officeDocument/2006/math">
-                    <m:oMathParaPr>
-                      <m:jc m:val="centerGroup"/>
-                    </m:oMathParaPr>
-                    <m:oMath xmlns:m="http://schemas.openxmlformats.org/officeDocument/2006/math">
-                      <m:r>
-                        <a:rPr lang="fr-FR" b="1" i="1" smtClean="0">
-                          <a:latin typeface="Cambria Math" panose="02040503050406030204" pitchFamily="18" charset="0"/>
-                        </a:rPr>
-                        <m:t>𝒉𝒊𝒈𝒉𝒆𝒓𝒐𝒓𝒅𝒆𝒓</m:t>
-                      </m:r>
-                      <m:r>
-                        <a:rPr lang="fr-FR" b="1" i="1" smtClean="0">
-                          <a:latin typeface="Cambria Math" panose="02040503050406030204" pitchFamily="18" charset="0"/>
-                        </a:rPr>
-                        <m:t> </m:t>
-                      </m:r>
-                      <m:r>
-                        <a:rPr lang="fr-FR" b="1" i="1" smtClean="0">
-                          <a:latin typeface="Cambria Math" panose="02040503050406030204" pitchFamily="18" charset="0"/>
-                        </a:rPr>
-                        <m:t>𝒊𝒏𝒕𝒆𝒓𝒂𝒄𝒕𝒊𝒐𝒏𝒔</m:t>
-                      </m:r>
-                      <m:r>
-                        <a:rPr lang="fr-FR" b="1" i="1" smtClean="0">
-                          <a:latin typeface="Cambria Math" panose="02040503050406030204" pitchFamily="18" charset="0"/>
-                        </a:rPr>
-                        <m:t>=  </m:t>
-                      </m:r>
-                    </m:oMath>
-                  </m:oMathPara>
+                  <m:oMath xmlns:m="http://schemas.openxmlformats.org/officeDocument/2006/math">
+                    <m:m>
+                      <m:mPr>
+                        <m:mcs>
+                          <m:mc>
+                            <m:mcPr>
+                              <m:count m:val="7"/>
+                              <m:mcJc m:val="center"/>
+                            </m:mcPr>
+                          </m:mc>
+                        </m:mcs>
+                        <m:ctrlPr>
+                          <a:rPr lang="fr-FR" sz="2400" b="0" i="1" smtClean="0">
+                            <a:latin typeface="Cambria Math" panose="02040503050406030204" pitchFamily="18" charset="0"/>
+                          </a:rPr>
+                        </m:ctrlPr>
+                      </m:mPr>
+                      <m:mr>
+                        <m:e>
+                          <m:r>
+                            <m:rPr>
+                              <m:brk m:alnAt="7"/>
+                            </m:rPr>
+                            <a:rPr lang="fr-FR" sz="2400" b="0" i="1" smtClean="0">
+                              <a:latin typeface="Cambria Math" panose="02040503050406030204" pitchFamily="18" charset="0"/>
+                            </a:rPr>
+                            <m:t>𝑜</m:t>
+                          </m:r>
+                          <m:r>
+                            <a:rPr lang="fr-FR" sz="2400" b="0" i="1" smtClean="0">
+                              <a:latin typeface="Cambria Math" panose="02040503050406030204" pitchFamily="18" charset="0"/>
+                            </a:rPr>
+                            <m:t>𝑏𝑠𝑒𝑟𝑣𝑎𝑡𝑖𝑜𝑛𝑠</m:t>
+                          </m:r>
+                        </m:e>
+                        <m:e>
+                          <m:r>
+                            <a:rPr lang="fr-FR" sz="2400" b="0" i="1" smtClean="0">
+                              <a:latin typeface="Cambria Math" panose="02040503050406030204" pitchFamily="18" charset="0"/>
+                            </a:rPr>
+                            <m:t>𝑓𝑜𝑐𝑎𝑙</m:t>
+                          </m:r>
+                          <m:r>
+                            <a:rPr lang="fr-FR" sz="2400" b="0" i="1" smtClean="0">
+                              <a:latin typeface="Cambria Math" panose="02040503050406030204" pitchFamily="18" charset="0"/>
+                            </a:rPr>
+                            <m:t> </m:t>
+                          </m:r>
+                          <m:r>
+                            <m:rPr>
+                              <m:brk m:alnAt="7"/>
+                            </m:rPr>
+                            <a:rPr lang="fr-FR" sz="2400" b="0" i="1" smtClean="0">
+                              <a:latin typeface="Cambria Math" panose="02040503050406030204" pitchFamily="18" charset="0"/>
+                            </a:rPr>
+                            <m:t>𝑠</m:t>
+                          </m:r>
+                          <m:r>
+                            <a:rPr lang="fr-FR" sz="2400" b="0" i="1" smtClean="0">
+                              <a:latin typeface="Cambria Math" panose="02040503050406030204" pitchFamily="18" charset="0"/>
+                            </a:rPr>
+                            <m:t>𝑒𝑒𝑑</m:t>
+                          </m:r>
+                        </m:e>
+                        <m:e>
+                          <m:r>
+                            <a:rPr lang="fr-FR" sz="2400" b="0" i="1" smtClean="0">
+                              <a:latin typeface="Cambria Math" panose="02040503050406030204" pitchFamily="18" charset="0"/>
+                            </a:rPr>
+                            <m:t>𝑠𝑝𝑒𝑐𝑖𝑒𝑠</m:t>
+                          </m:r>
+                          <m:r>
+                            <a:rPr lang="fr-FR" sz="2400" b="0" i="1" smtClean="0">
+                              <a:latin typeface="Cambria Math" panose="02040503050406030204" pitchFamily="18" charset="0"/>
+                            </a:rPr>
+                            <m:t> </m:t>
+                          </m:r>
+                          <m:r>
+                            <a:rPr lang="fr-FR" sz="2400" b="0" i="1" smtClean="0">
+                              <a:latin typeface="Cambria Math" panose="02040503050406030204" pitchFamily="18" charset="0"/>
+                            </a:rPr>
+                            <m:t>𝑖</m:t>
+                          </m:r>
+                        </m:e>
+                        <m:e>
+                          <m:r>
+                            <a:rPr lang="fr-FR" sz="2400" b="0" i="1" smtClean="0">
+                              <a:latin typeface="Cambria Math" panose="02040503050406030204" pitchFamily="18" charset="0"/>
+                            </a:rPr>
+                            <m:t>𝑠𝑝𝑒𝑐𝑖𝑒𝑠</m:t>
+                          </m:r>
+                          <m:r>
+                            <a:rPr lang="fr-FR" sz="2400" b="0" i="1" smtClean="0">
+                              <a:latin typeface="Cambria Math" panose="02040503050406030204" pitchFamily="18" charset="0"/>
+                            </a:rPr>
+                            <m:t> </m:t>
+                          </m:r>
+                          <m:r>
+                            <a:rPr lang="fr-FR" sz="2400" b="0" i="1" smtClean="0">
+                              <a:latin typeface="Cambria Math" panose="02040503050406030204" pitchFamily="18" charset="0"/>
+                            </a:rPr>
+                            <m:t>𝑗</m:t>
+                          </m:r>
+                        </m:e>
+                        <m:e>
+                          <m:r>
+                            <a:rPr lang="fr-FR" sz="2400" b="0" i="1" smtClean="0">
+                              <a:latin typeface="Cambria Math" panose="02040503050406030204" pitchFamily="18" charset="0"/>
+                            </a:rPr>
+                            <m:t>𝑠𝑝𝑒𝑐𝑖𝑒𝑠</m:t>
+                          </m:r>
+                          <m:r>
+                            <a:rPr lang="fr-FR" sz="2400" b="0" i="1" smtClean="0">
+                              <a:latin typeface="Cambria Math" panose="02040503050406030204" pitchFamily="18" charset="0"/>
+                            </a:rPr>
+                            <m:t> </m:t>
+                          </m:r>
+                          <m:r>
+                            <a:rPr lang="fr-FR" sz="2400" b="0" i="1" smtClean="0">
+                              <a:latin typeface="Cambria Math" panose="02040503050406030204" pitchFamily="18" charset="0"/>
+                            </a:rPr>
+                            <m:t>𝑘</m:t>
+                          </m:r>
+                        </m:e>
+                        <m:e>
+                          <m:r>
+                            <a:rPr lang="fr-FR" sz="2400" b="0" i="1" smtClean="0">
+                              <a:latin typeface="Cambria Math" panose="02040503050406030204" pitchFamily="18" charset="0"/>
+                            </a:rPr>
+                            <m:t>𝐻𝑇𝐿</m:t>
+                          </m:r>
+                          <m:r>
+                            <a:rPr lang="fr-FR" sz="2400" b="0" i="1" smtClean="0">
+                              <a:latin typeface="Cambria Math" panose="02040503050406030204" pitchFamily="18" charset="0"/>
+                            </a:rPr>
+                            <m:t> </m:t>
+                          </m:r>
+                          <m:r>
+                            <a:rPr lang="fr-FR" sz="2400" b="0" i="1" smtClean="0">
+                              <a:latin typeface="Cambria Math" panose="02040503050406030204" pitchFamily="18" charset="0"/>
+                            </a:rPr>
+                            <m:t>𝑙</m:t>
+                          </m:r>
+                        </m:e>
+                        <m:e>
+                          <m:r>
+                            <a:rPr lang="fr-FR" sz="2400" b="0" i="1" smtClean="0">
+                              <a:latin typeface="Cambria Math" panose="02040503050406030204" pitchFamily="18" charset="0"/>
+                            </a:rPr>
+                            <m:t>𝐻𝑇𝐿</m:t>
+                          </m:r>
+                          <m:r>
+                            <a:rPr lang="fr-FR" sz="2400" b="0" i="1" smtClean="0">
+                              <a:latin typeface="Cambria Math" panose="02040503050406030204" pitchFamily="18" charset="0"/>
+                            </a:rPr>
+                            <m:t> </m:t>
+                          </m:r>
+                          <m:r>
+                            <a:rPr lang="fr-FR" sz="2400" b="0" i="1" smtClean="0">
+                              <a:latin typeface="Cambria Math" panose="02040503050406030204" pitchFamily="18" charset="0"/>
+                            </a:rPr>
+                            <m:t>𝑚</m:t>
+                          </m:r>
+                        </m:e>
+                      </m:mr>
+                      <m:mr>
+                        <m:e>
+                          <m:r>
+                            <a:rPr lang="fr-FR" sz="2400" b="0" i="1" smtClean="0">
+                              <a:latin typeface="Cambria Math" panose="02040503050406030204" pitchFamily="18" charset="0"/>
+                            </a:rPr>
+                            <m:t>𝑜𝑏𝑠</m:t>
+                          </m:r>
+                          <m:r>
+                            <a:rPr lang="fr-FR" sz="2400" b="0" i="1" smtClean="0">
+                              <a:latin typeface="Cambria Math" panose="02040503050406030204" pitchFamily="18" charset="0"/>
+                            </a:rPr>
+                            <m:t> 1</m:t>
+                          </m:r>
+                        </m:e>
+                        <m:e>
+                          <m:r>
+                            <a:rPr lang="fr-FR" sz="2400" b="0" i="1" smtClean="0">
+                              <a:latin typeface="Cambria Math" panose="02040503050406030204" pitchFamily="18" charset="0"/>
+                            </a:rPr>
+                            <m:t>6</m:t>
+                          </m:r>
+                        </m:e>
+                        <m:e>
+                          <m:r>
+                            <a:rPr lang="fr-FR" sz="2400" b="0" i="1" smtClean="0">
+                              <a:latin typeface="Cambria Math" panose="02040503050406030204" pitchFamily="18" charset="0"/>
+                            </a:rPr>
+                            <m:t>0</m:t>
+                          </m:r>
+                        </m:e>
+                        <m:e>
+                          <m:r>
+                            <a:rPr lang="fr-FR" sz="2400" b="0" i="1" smtClean="0">
+                              <a:latin typeface="Cambria Math" panose="02040503050406030204" pitchFamily="18" charset="0"/>
+                            </a:rPr>
+                            <m:t>2</m:t>
+                          </m:r>
+                        </m:e>
+                        <m:e>
+                          <m:r>
+                            <a:rPr lang="fr-FR" sz="2400" b="0" i="1" smtClean="0">
+                              <a:latin typeface="Cambria Math" panose="02040503050406030204" pitchFamily="18" charset="0"/>
+                            </a:rPr>
+                            <m:t>5</m:t>
+                          </m:r>
+                        </m:e>
+                        <m:e>
+                          <m:r>
+                            <a:rPr lang="fr-FR" sz="2400" b="0" i="1" smtClean="0">
+                              <a:latin typeface="Cambria Math" panose="02040503050406030204" pitchFamily="18" charset="0"/>
+                            </a:rPr>
+                            <m:t>1</m:t>
+                          </m:r>
+                        </m:e>
+                        <m:e>
+                          <m:r>
+                            <a:rPr lang="fr-FR" sz="2400" b="0" i="1" smtClean="0">
+                              <a:latin typeface="Cambria Math" panose="02040503050406030204" pitchFamily="18" charset="0"/>
+                            </a:rPr>
+                            <m:t>3</m:t>
+                          </m:r>
+                        </m:e>
+                      </m:mr>
+                      <m:mr>
+                        <m:e>
+                          <m:r>
+                            <a:rPr lang="fr-FR" sz="2400" b="0" i="1" smtClean="0">
+                              <a:latin typeface="Cambria Math" panose="02040503050406030204" pitchFamily="18" charset="0"/>
+                            </a:rPr>
+                            <m:t>𝑜𝑏𝑠</m:t>
+                          </m:r>
+                          <m:r>
+                            <a:rPr lang="fr-FR" sz="2400" b="0" i="1" smtClean="0">
+                              <a:latin typeface="Cambria Math" panose="02040503050406030204" pitchFamily="18" charset="0"/>
+                            </a:rPr>
+                            <m:t> 2</m:t>
+                          </m:r>
+                        </m:e>
+                        <m:e>
+                          <m:r>
+                            <a:rPr lang="fr-FR" sz="2400" b="0" i="1" smtClean="0">
+                              <a:latin typeface="Cambria Math" panose="02040503050406030204" pitchFamily="18" charset="0"/>
+                            </a:rPr>
+                            <m:t>5</m:t>
+                          </m:r>
+                        </m:e>
+                        <m:e>
+                          <m:r>
+                            <a:rPr lang="fr-FR" sz="2400" b="0" i="1" smtClean="0">
+                              <a:latin typeface="Cambria Math" panose="02040503050406030204" pitchFamily="18" charset="0"/>
+                            </a:rPr>
+                            <m:t>1</m:t>
+                          </m:r>
+                        </m:e>
+                        <m:e>
+                          <m:r>
+                            <a:rPr lang="fr-FR" sz="2400" b="0" i="1" smtClean="0">
+                              <a:latin typeface="Cambria Math" panose="02040503050406030204" pitchFamily="18" charset="0"/>
+                            </a:rPr>
+                            <m:t>3</m:t>
+                          </m:r>
+                        </m:e>
+                        <m:e>
+                          <m:r>
+                            <a:rPr lang="fr-FR" sz="2400" b="0" i="1" smtClean="0">
+                              <a:latin typeface="Cambria Math" panose="02040503050406030204" pitchFamily="18" charset="0"/>
+                            </a:rPr>
+                            <m:t>6</m:t>
+                          </m:r>
+                        </m:e>
+                        <m:e>
+                          <m:r>
+                            <a:rPr lang="fr-FR" sz="2400" b="0" i="1" smtClean="0">
+                              <a:latin typeface="Cambria Math" panose="02040503050406030204" pitchFamily="18" charset="0"/>
+                            </a:rPr>
+                            <m:t>0</m:t>
+                          </m:r>
+                        </m:e>
+                        <m:e>
+                          <m:r>
+                            <a:rPr lang="fr-FR" sz="2400" b="0" i="1" smtClean="0">
+                              <a:latin typeface="Cambria Math" panose="02040503050406030204" pitchFamily="18" charset="0"/>
+                            </a:rPr>
+                            <m:t>2</m:t>
+                          </m:r>
+                        </m:e>
+                      </m:mr>
+                    </m:m>
+                  </m:oMath>
                 </a14:m>
-                <a:endParaRPr lang="en-GB" dirty="0"/>
+                <a:endParaRPr lang="fr-FR" sz="2400" b="0" dirty="0">
+                  <a:solidFill>
+                    <a:schemeClr val="accent2"/>
+                  </a:solidFill>
+                </a:endParaRPr>
               </a:p>
             </p:txBody>
           </p:sp>
@@ -8229,10 +8711,10 @@
         <mc:Fallback>
           <p:sp>
             <p:nvSpPr>
-              <p:cNvPr id="14" name="TextBox 13">
+              <p:cNvPr id="3" name="TextBox 2">
                 <a:extLst>
                   <a:ext uri="{FF2B5EF4-FFF2-40B4-BE49-F238E27FC236}">
-                    <a16:creationId xmlns:a16="http://schemas.microsoft.com/office/drawing/2014/main" id="{FB268263-6621-A84C-A9AB-BCAA414D18CE}"/>
+                    <a16:creationId xmlns:a16="http://schemas.microsoft.com/office/drawing/2014/main" id="{15A293A7-B477-E449-9235-A5558781042E}"/>
                   </a:ext>
                 </a:extLst>
               </p:cNvPr>
@@ -8243,16 +8725,16 @@
             </p:nvSpPr>
             <p:spPr>
               <a:xfrm>
-                <a:off x="3492103" y="5575665"/>
-                <a:ext cx="4207669" cy="369332"/>
+                <a:off x="415600" y="818270"/>
+                <a:ext cx="11522400" cy="2160591"/>
               </a:xfrm>
               <a:prstGeom prst="rect">
                 <a:avLst/>
               </a:prstGeom>
               <a:blipFill>
-                <a:blip r:embed="rId6"/>
+                <a:blip r:embed="rId2"/>
                 <a:stretch>
-                  <a:fillRect b="-13333"/>
+                  <a:fillRect l="-1652" t="-4094" b="-7018"/>
                 </a:stretch>
               </a:blipFill>
             </p:spPr>
@@ -8271,10 +8753,2358 @@
           </p:sp>
         </mc:Fallback>
       </mc:AlternateContent>
+      <p:sp>
+        <p:nvSpPr>
+          <p:cNvPr id="4" name="Rectangle 3">
+            <a:extLst>
+              <a:ext uri="{FF2B5EF4-FFF2-40B4-BE49-F238E27FC236}">
+                <a16:creationId xmlns:a16="http://schemas.microsoft.com/office/drawing/2014/main" id="{3F4E9C00-84D9-6045-ABE7-0E313C8AF865}"/>
+              </a:ext>
+            </a:extLst>
+          </p:cNvPr>
+          <p:cNvSpPr/>
+          <p:nvPr/>
+        </p:nvSpPr>
+        <p:spPr>
+          <a:xfrm>
+            <a:off x="4301067" y="1879601"/>
+            <a:ext cx="4402666" cy="1270000"/>
+          </a:xfrm>
+          <a:prstGeom prst="rect">
+            <a:avLst/>
+          </a:prstGeom>
+          <a:noFill/>
+          <a:ln>
+            <a:solidFill>
+              <a:schemeClr val="accent1"/>
+            </a:solidFill>
+          </a:ln>
+        </p:spPr>
+        <p:style>
+          <a:lnRef idx="2">
+            <a:schemeClr val="accent1">
+              <a:shade val="50000"/>
+            </a:schemeClr>
+          </a:lnRef>
+          <a:fillRef idx="1">
+            <a:schemeClr val="accent1"/>
+          </a:fillRef>
+          <a:effectRef idx="0">
+            <a:schemeClr val="accent1"/>
+          </a:effectRef>
+          <a:fontRef idx="minor">
+            <a:schemeClr val="lt1"/>
+          </a:fontRef>
+        </p:style>
+        <p:txBody>
+          <a:bodyPr rtlCol="0" anchor="ctr"/>
+          <a:lstStyle/>
+          <a:p>
+            <a:pPr algn="ctr"/>
+            <a:endParaRPr lang="en-GB"/>
+          </a:p>
+        </p:txBody>
+      </p:sp>
+      <p:sp>
+        <p:nvSpPr>
+          <p:cNvPr id="5" name="Rectangle 4">
+            <a:extLst>
+              <a:ext uri="{FF2B5EF4-FFF2-40B4-BE49-F238E27FC236}">
+                <a16:creationId xmlns:a16="http://schemas.microsoft.com/office/drawing/2014/main" id="{3F67C093-211A-FA4E-9684-1B6F6C586CD8}"/>
+              </a:ext>
+            </a:extLst>
+          </p:cNvPr>
+          <p:cNvSpPr/>
+          <p:nvPr/>
+        </p:nvSpPr>
+        <p:spPr>
+          <a:xfrm>
+            <a:off x="8815388" y="1879601"/>
+            <a:ext cx="1757361" cy="1270000"/>
+          </a:xfrm>
+          <a:prstGeom prst="rect">
+            <a:avLst/>
+          </a:prstGeom>
+          <a:noFill/>
+          <a:ln>
+            <a:solidFill>
+              <a:schemeClr val="accent2"/>
+            </a:solidFill>
+          </a:ln>
+        </p:spPr>
+        <p:style>
+          <a:lnRef idx="2">
+            <a:schemeClr val="accent1">
+              <a:shade val="50000"/>
+            </a:schemeClr>
+          </a:lnRef>
+          <a:fillRef idx="1">
+            <a:schemeClr val="accent1"/>
+          </a:fillRef>
+          <a:effectRef idx="0">
+            <a:schemeClr val="accent1"/>
+          </a:effectRef>
+          <a:fontRef idx="minor">
+            <a:schemeClr val="lt1"/>
+          </a:fontRef>
+        </p:style>
+        <p:txBody>
+          <a:bodyPr rtlCol="0" anchor="ctr"/>
+          <a:lstStyle/>
+          <a:p>
+            <a:pPr algn="ctr"/>
+            <a:endParaRPr lang="en-GB">
+              <a:solidFill>
+                <a:schemeClr val="accent2"/>
+              </a:solidFill>
+            </a:endParaRPr>
+          </a:p>
+        </p:txBody>
+      </p:sp>
+      <p:sp>
+        <p:nvSpPr>
+          <p:cNvPr id="12" name="TextBox 11">
+            <a:extLst>
+              <a:ext uri="{FF2B5EF4-FFF2-40B4-BE49-F238E27FC236}">
+                <a16:creationId xmlns:a16="http://schemas.microsoft.com/office/drawing/2014/main" id="{2C466D7A-9355-8541-87E5-121427C78F49}"/>
+              </a:ext>
+            </a:extLst>
+          </p:cNvPr>
+          <p:cNvSpPr txBox="1"/>
+          <p:nvPr/>
+        </p:nvSpPr>
+        <p:spPr>
+          <a:xfrm>
+            <a:off x="8538700" y="2228113"/>
+            <a:ext cx="441722" cy="707886"/>
+          </a:xfrm>
+          <a:prstGeom prst="rect">
+            <a:avLst/>
+          </a:prstGeom>
+          <a:noFill/>
+        </p:spPr>
+        <p:txBody>
+          <a:bodyPr wrap="square">
+            <a:spAutoFit/>
+          </a:bodyPr>
+          <a:lstStyle/>
+          <a:p>
+            <a:r>
+              <a:rPr lang="fr-FR" sz="4000" b="0" dirty="0"/>
+              <a:t>*</a:t>
+            </a:r>
+            <a:endParaRPr lang="en-GB" sz="4000" dirty="0"/>
+          </a:p>
+        </p:txBody>
+      </p:sp>
+      <mc:AlternateContent xmlns:mc="http://schemas.openxmlformats.org/markup-compatibility/2006">
+        <mc:Choice xmlns:a14="http://schemas.microsoft.com/office/drawing/2010/main" Requires="a14">
+          <p:sp>
+            <p:nvSpPr>
+              <p:cNvPr id="13" name="TextBox 12">
+                <a:extLst>
+                  <a:ext uri="{FF2B5EF4-FFF2-40B4-BE49-F238E27FC236}">
+                    <a16:creationId xmlns:a16="http://schemas.microsoft.com/office/drawing/2014/main" id="{48006084-6055-D143-849B-619EC23CE47E}"/>
+                  </a:ext>
+                </a:extLst>
+              </p:cNvPr>
+              <p:cNvSpPr txBox="1"/>
+              <p:nvPr/>
+            </p:nvSpPr>
+            <p:spPr>
+              <a:xfrm>
+                <a:off x="254000" y="3435237"/>
+                <a:ext cx="11522400" cy="1324658"/>
+              </a:xfrm>
+              <a:prstGeom prst="rect">
+                <a:avLst/>
+              </a:prstGeom>
+              <a:noFill/>
+            </p:spPr>
+            <p:txBody>
+              <a:bodyPr wrap="square" lIns="0" tIns="0" rIns="0" bIns="0" rtlCol="0">
+                <a:spAutoFit/>
+              </a:bodyPr>
+              <a:lstStyle/>
+              <a:p>
+                <a:r>
+                  <a:rPr lang="fr-FR" sz="2400" dirty="0"/>
+                  <a:t>The multiplication </a:t>
+                </a:r>
+                <a:r>
+                  <a:rPr lang="fr-FR" sz="2400" dirty="0" err="1"/>
+                  <a:t>gives</a:t>
+                </a:r>
+                <a:r>
+                  <a:rPr lang="fr-FR" sz="2400" dirty="0"/>
+                  <a:t> a matrix </a:t>
+                </a:r>
+                <a:r>
+                  <a:rPr lang="fr-FR" sz="2400" dirty="0" err="1"/>
+                  <a:t>with</a:t>
+                </a:r>
+                <a:r>
+                  <a:rPr lang="fr-FR" sz="2400" dirty="0"/>
+                  <a:t> </a:t>
+                </a:r>
+                <a:r>
+                  <a:rPr lang="fr-FR" sz="2400" dirty="0" err="1"/>
+                  <a:t>number</a:t>
+                </a:r>
+                <a:r>
+                  <a:rPr lang="fr-FR" sz="2400" dirty="0"/>
+                  <a:t> of </a:t>
+                </a:r>
+                <a:r>
+                  <a:rPr lang="fr-FR" sz="2400" dirty="0" err="1"/>
+                  <a:t>columns</a:t>
+                </a:r>
+                <a:r>
+                  <a:rPr lang="fr-FR" sz="2400" dirty="0"/>
+                  <a:t> = </a:t>
+                </a:r>
+                <a:r>
+                  <a:rPr lang="fr-FR" sz="2400" dirty="0" err="1"/>
+                  <a:t>lenth</a:t>
+                </a:r>
+                <a:r>
+                  <a:rPr lang="fr-FR" sz="2400" dirty="0"/>
+                  <a:t>(plants)*</a:t>
+                </a:r>
+                <a:r>
+                  <a:rPr lang="fr-FR" sz="2400" dirty="0" err="1"/>
+                  <a:t>length</a:t>
+                </a:r>
+                <a:r>
+                  <a:rPr lang="fr-FR" sz="2400" dirty="0"/>
+                  <a:t>(HTL) </a:t>
+                </a:r>
+              </a:p>
+              <a:p>
+                <a:endParaRPr lang="fr-FR" sz="2400" dirty="0"/>
+              </a:p>
+              <a:p>
+                <a:r>
+                  <a:rPr lang="fr-FR" sz="2400" dirty="0"/>
+                  <a:t> </a:t>
+                </a:r>
+                <a14:m>
+                  <m:oMath xmlns:m="http://schemas.openxmlformats.org/officeDocument/2006/math">
+                    <m:m>
+                      <m:mPr>
+                        <m:mcs>
+                          <m:mc>
+                            <m:mcPr>
+                              <m:count m:val="8"/>
+                              <m:mcJc m:val="center"/>
+                            </m:mcPr>
+                          </m:mc>
+                        </m:mcs>
+                        <m:ctrlPr>
+                          <a:rPr lang="fr-FR" sz="1400" b="0" i="1" smtClean="0">
+                            <a:latin typeface="Cambria Math" panose="02040503050406030204" pitchFamily="18" charset="0"/>
+                          </a:rPr>
+                        </m:ctrlPr>
+                      </m:mPr>
+                      <m:mr>
+                        <m:e>
+                          <m:r>
+                            <m:rPr>
+                              <m:brk m:alnAt="7"/>
+                            </m:rPr>
+                            <a:rPr lang="fr-FR" sz="1400" b="0" i="1" smtClean="0">
+                              <a:latin typeface="Cambria Math" panose="02040503050406030204" pitchFamily="18" charset="0"/>
+                            </a:rPr>
+                            <m:t>𝑜</m:t>
+                          </m:r>
+                          <m:r>
+                            <a:rPr lang="fr-FR" sz="1400" b="0" i="1" smtClean="0">
+                              <a:latin typeface="Cambria Math" panose="02040503050406030204" pitchFamily="18" charset="0"/>
+                            </a:rPr>
+                            <m:t>𝑏𝑠𝑒𝑟𝑣𝑎𝑡𝑖𝑜𝑛𝑠</m:t>
+                          </m:r>
+                        </m:e>
+                        <m:e>
+                          <m:r>
+                            <a:rPr lang="fr-FR" sz="1400" b="0" i="1" smtClean="0">
+                              <a:latin typeface="Cambria Math" panose="02040503050406030204" pitchFamily="18" charset="0"/>
+                            </a:rPr>
+                            <m:t>𝑓𝑜𝑐𝑎𝑙</m:t>
+                          </m:r>
+                          <m:r>
+                            <a:rPr lang="fr-FR" sz="1400" b="0" i="1" smtClean="0">
+                              <a:latin typeface="Cambria Math" panose="02040503050406030204" pitchFamily="18" charset="0"/>
+                            </a:rPr>
+                            <m:t> </m:t>
+                          </m:r>
+                          <m:r>
+                            <m:rPr>
+                              <m:brk m:alnAt="7"/>
+                            </m:rPr>
+                            <a:rPr lang="fr-FR" sz="1400" b="0" i="1" smtClean="0">
+                              <a:latin typeface="Cambria Math" panose="02040503050406030204" pitchFamily="18" charset="0"/>
+                            </a:rPr>
+                            <m:t>𝑠</m:t>
+                          </m:r>
+                          <m:r>
+                            <a:rPr lang="fr-FR" sz="1400" b="0" i="1" smtClean="0">
+                              <a:latin typeface="Cambria Math" panose="02040503050406030204" pitchFamily="18" charset="0"/>
+                            </a:rPr>
+                            <m:t>𝑒𝑒𝑑</m:t>
+                          </m:r>
+                        </m:e>
+                        <m:e>
+                          <m:r>
+                            <a:rPr lang="fr-FR" sz="1400" b="0" i="1" smtClean="0">
+                              <a:latin typeface="Cambria Math" panose="02040503050406030204" pitchFamily="18" charset="0"/>
+                            </a:rPr>
+                            <m:t>𝑠𝑝𝑒𝑐𝑖𝑒𝑠</m:t>
+                          </m:r>
+                          <m:r>
+                            <a:rPr lang="fr-FR" sz="1400" b="0" i="1" smtClean="0">
+                              <a:latin typeface="Cambria Math" panose="02040503050406030204" pitchFamily="18" charset="0"/>
+                            </a:rPr>
+                            <m:t> </m:t>
+                          </m:r>
+                          <m:r>
+                            <a:rPr lang="fr-FR" sz="1400" b="0" i="1" smtClean="0">
+                              <a:latin typeface="Cambria Math" panose="02040503050406030204" pitchFamily="18" charset="0"/>
+                            </a:rPr>
+                            <m:t>𝑖</m:t>
+                          </m:r>
+                          <m:r>
+                            <a:rPr lang="fr-FR" sz="1400" b="0" i="1" smtClean="0">
+                              <a:latin typeface="Cambria Math" panose="02040503050406030204" pitchFamily="18" charset="0"/>
+                            </a:rPr>
+                            <m:t>∗</m:t>
+                          </m:r>
+                          <m:r>
+                            <a:rPr lang="fr-FR" sz="1400" b="0" i="1" smtClean="0">
+                              <a:latin typeface="Cambria Math" panose="02040503050406030204" pitchFamily="18" charset="0"/>
+                            </a:rPr>
+                            <m:t>𝐻𝑇𝐿</m:t>
+                          </m:r>
+                          <m:r>
+                            <a:rPr lang="fr-FR" sz="1400" b="0" i="1" smtClean="0">
+                              <a:latin typeface="Cambria Math" panose="02040503050406030204" pitchFamily="18" charset="0"/>
+                            </a:rPr>
+                            <m:t> </m:t>
+                          </m:r>
+                          <m:r>
+                            <a:rPr lang="fr-FR" sz="1400" b="0" i="1" smtClean="0">
+                              <a:latin typeface="Cambria Math" panose="02040503050406030204" pitchFamily="18" charset="0"/>
+                            </a:rPr>
+                            <m:t>𝑙</m:t>
+                          </m:r>
+                        </m:e>
+                        <m:e>
+                          <m:r>
+                            <a:rPr lang="fr-FR" sz="1400" b="0" i="1" smtClean="0">
+                              <a:latin typeface="Cambria Math" panose="02040503050406030204" pitchFamily="18" charset="0"/>
+                            </a:rPr>
+                            <m:t>𝑠𝑝𝑒𝑐𝑖𝑒𝑠</m:t>
+                          </m:r>
+                          <m:r>
+                            <a:rPr lang="fr-FR" sz="1400" b="0" i="1" smtClean="0">
+                              <a:latin typeface="Cambria Math" panose="02040503050406030204" pitchFamily="18" charset="0"/>
+                            </a:rPr>
+                            <m:t> </m:t>
+                          </m:r>
+                          <m:r>
+                            <a:rPr lang="fr-FR" sz="1400" b="0" i="1" smtClean="0">
+                              <a:latin typeface="Cambria Math" panose="02040503050406030204" pitchFamily="18" charset="0"/>
+                            </a:rPr>
+                            <m:t>𝑖</m:t>
+                          </m:r>
+                          <m:r>
+                            <a:rPr lang="fr-FR" sz="1400" b="0" i="1" smtClean="0">
+                              <a:latin typeface="Cambria Math" panose="02040503050406030204" pitchFamily="18" charset="0"/>
+                            </a:rPr>
+                            <m:t>∗</m:t>
+                          </m:r>
+                          <m:r>
+                            <a:rPr lang="fr-FR" sz="1400" b="0" i="1" smtClean="0">
+                              <a:latin typeface="Cambria Math" panose="02040503050406030204" pitchFamily="18" charset="0"/>
+                            </a:rPr>
+                            <m:t>𝐻𝑇𝐿</m:t>
+                          </m:r>
+                          <m:r>
+                            <a:rPr lang="fr-FR" sz="1400" b="0" i="1" smtClean="0">
+                              <a:latin typeface="Cambria Math" panose="02040503050406030204" pitchFamily="18" charset="0"/>
+                            </a:rPr>
+                            <m:t> </m:t>
+                          </m:r>
+                          <m:r>
+                            <a:rPr lang="fr-FR" sz="1400" b="0" i="1" smtClean="0">
+                              <a:latin typeface="Cambria Math" panose="02040503050406030204" pitchFamily="18" charset="0"/>
+                            </a:rPr>
+                            <m:t>𝑚</m:t>
+                          </m:r>
+                        </m:e>
+                        <m:e>
+                          <m:r>
+                            <a:rPr lang="fr-FR" sz="1400" b="0" i="1" smtClean="0">
+                              <a:latin typeface="Cambria Math" panose="02040503050406030204" pitchFamily="18" charset="0"/>
+                            </a:rPr>
+                            <m:t>𝑠𝑝𝑒𝑐𝑖𝑒𝑠</m:t>
+                          </m:r>
+                          <m:r>
+                            <a:rPr lang="fr-FR" sz="1400" b="0" i="1" smtClean="0">
+                              <a:latin typeface="Cambria Math" panose="02040503050406030204" pitchFamily="18" charset="0"/>
+                            </a:rPr>
+                            <m:t> </m:t>
+                          </m:r>
+                          <m:r>
+                            <a:rPr lang="fr-FR" sz="1400" b="0" i="1" smtClean="0">
+                              <a:latin typeface="Cambria Math" panose="02040503050406030204" pitchFamily="18" charset="0"/>
+                            </a:rPr>
+                            <m:t>𝑗</m:t>
+                          </m:r>
+                          <m:r>
+                            <a:rPr lang="fr-FR" sz="1400" b="0" i="1" smtClean="0">
+                              <a:latin typeface="Cambria Math" panose="02040503050406030204" pitchFamily="18" charset="0"/>
+                            </a:rPr>
+                            <m:t>∗</m:t>
+                          </m:r>
+                          <m:r>
+                            <a:rPr lang="fr-FR" sz="1400" b="0" i="1" smtClean="0">
+                              <a:latin typeface="Cambria Math" panose="02040503050406030204" pitchFamily="18" charset="0"/>
+                            </a:rPr>
+                            <m:t>𝐻𝑇𝐿</m:t>
+                          </m:r>
+                          <m:r>
+                            <a:rPr lang="fr-FR" sz="1400" b="0" i="1" smtClean="0">
+                              <a:latin typeface="Cambria Math" panose="02040503050406030204" pitchFamily="18" charset="0"/>
+                            </a:rPr>
+                            <m:t> </m:t>
+                          </m:r>
+                          <m:r>
+                            <a:rPr lang="fr-FR" sz="1400" b="0" i="1" smtClean="0">
+                              <a:latin typeface="Cambria Math" panose="02040503050406030204" pitchFamily="18" charset="0"/>
+                            </a:rPr>
+                            <m:t>𝑙</m:t>
+                          </m:r>
+                        </m:e>
+                        <m:e>
+                          <m:r>
+                            <a:rPr lang="fr-FR" sz="1400" b="0" i="1" smtClean="0">
+                              <a:latin typeface="Cambria Math" panose="02040503050406030204" pitchFamily="18" charset="0"/>
+                            </a:rPr>
+                            <m:t>𝑠𝑝𝑒𝑐𝑖𝑒𝑠</m:t>
+                          </m:r>
+                          <m:r>
+                            <a:rPr lang="fr-FR" sz="1400" b="0" i="1" smtClean="0">
+                              <a:latin typeface="Cambria Math" panose="02040503050406030204" pitchFamily="18" charset="0"/>
+                            </a:rPr>
+                            <m:t> </m:t>
+                          </m:r>
+                          <m:r>
+                            <a:rPr lang="fr-FR" sz="1400" b="0" i="1" smtClean="0">
+                              <a:latin typeface="Cambria Math" panose="02040503050406030204" pitchFamily="18" charset="0"/>
+                            </a:rPr>
+                            <m:t>𝑗</m:t>
+                          </m:r>
+                          <m:r>
+                            <a:rPr lang="fr-FR" sz="1400" b="0" i="1" smtClean="0">
+                              <a:latin typeface="Cambria Math" panose="02040503050406030204" pitchFamily="18" charset="0"/>
+                            </a:rPr>
+                            <m:t> ∗</m:t>
+                          </m:r>
+                          <m:r>
+                            <a:rPr lang="fr-FR" sz="1400" b="0" i="1" smtClean="0">
+                              <a:latin typeface="Cambria Math" panose="02040503050406030204" pitchFamily="18" charset="0"/>
+                            </a:rPr>
+                            <m:t>𝐻𝑇𝐿</m:t>
+                          </m:r>
+                          <m:r>
+                            <a:rPr lang="fr-FR" sz="1400" b="0" i="1" smtClean="0">
+                              <a:latin typeface="Cambria Math" panose="02040503050406030204" pitchFamily="18" charset="0"/>
+                            </a:rPr>
+                            <m:t> </m:t>
+                          </m:r>
+                          <m:r>
+                            <a:rPr lang="fr-FR" sz="1400" b="0" i="1" smtClean="0">
+                              <a:latin typeface="Cambria Math" panose="02040503050406030204" pitchFamily="18" charset="0"/>
+                            </a:rPr>
+                            <m:t>𝑚</m:t>
+                          </m:r>
+                        </m:e>
+                        <m:e>
+                          <m:r>
+                            <a:rPr lang="fr-FR" sz="1400" b="0" i="1" smtClean="0">
+                              <a:latin typeface="Cambria Math" panose="02040503050406030204" pitchFamily="18" charset="0"/>
+                            </a:rPr>
+                            <m:t>𝑠𝑝𝑒𝑐𝑖𝑒𝑠</m:t>
+                          </m:r>
+                          <m:r>
+                            <a:rPr lang="fr-FR" sz="1400" b="0" i="1" smtClean="0">
+                              <a:latin typeface="Cambria Math" panose="02040503050406030204" pitchFamily="18" charset="0"/>
+                            </a:rPr>
+                            <m:t> </m:t>
+                          </m:r>
+                          <m:r>
+                            <a:rPr lang="fr-FR" sz="1400" b="0" i="1" smtClean="0">
+                              <a:latin typeface="Cambria Math" panose="02040503050406030204" pitchFamily="18" charset="0"/>
+                            </a:rPr>
+                            <m:t>𝑘</m:t>
+                          </m:r>
+                          <m:r>
+                            <a:rPr lang="fr-FR" sz="1400" b="0" i="1" smtClean="0">
+                              <a:latin typeface="Cambria Math" panose="02040503050406030204" pitchFamily="18" charset="0"/>
+                            </a:rPr>
+                            <m:t> ∗</m:t>
+                          </m:r>
+                          <m:r>
+                            <a:rPr lang="fr-FR" sz="1400" b="0" i="1" smtClean="0">
+                              <a:latin typeface="Cambria Math" panose="02040503050406030204" pitchFamily="18" charset="0"/>
+                            </a:rPr>
+                            <m:t>𝐻𝑇𝐿</m:t>
+                          </m:r>
+                          <m:r>
+                            <a:rPr lang="fr-FR" sz="1400" b="0" i="1" smtClean="0">
+                              <a:latin typeface="Cambria Math" panose="02040503050406030204" pitchFamily="18" charset="0"/>
+                            </a:rPr>
+                            <m:t> </m:t>
+                          </m:r>
+                          <m:r>
+                            <a:rPr lang="fr-FR" sz="1400" b="0" i="1" smtClean="0">
+                              <a:latin typeface="Cambria Math" panose="02040503050406030204" pitchFamily="18" charset="0"/>
+                            </a:rPr>
+                            <m:t>𝑙</m:t>
+                          </m:r>
+                        </m:e>
+                        <m:e>
+                          <m:r>
+                            <a:rPr lang="fr-FR" sz="1400" b="0" i="1" smtClean="0">
+                              <a:latin typeface="Cambria Math" panose="02040503050406030204" pitchFamily="18" charset="0"/>
+                            </a:rPr>
+                            <m:t>𝑠𝑝𝑒𝑐𝑖𝑒𝑠</m:t>
+                          </m:r>
+                          <m:r>
+                            <a:rPr lang="fr-FR" sz="1400" b="0" i="1" smtClean="0">
+                              <a:latin typeface="Cambria Math" panose="02040503050406030204" pitchFamily="18" charset="0"/>
+                            </a:rPr>
+                            <m:t> </m:t>
+                          </m:r>
+                          <m:r>
+                            <a:rPr lang="fr-FR" sz="1400" b="0" i="1" smtClean="0">
+                              <a:latin typeface="Cambria Math" panose="02040503050406030204" pitchFamily="18" charset="0"/>
+                            </a:rPr>
+                            <m:t>𝑘</m:t>
+                          </m:r>
+                          <m:r>
+                            <a:rPr lang="fr-FR" sz="1400" b="0" i="1" smtClean="0">
+                              <a:latin typeface="Cambria Math" panose="02040503050406030204" pitchFamily="18" charset="0"/>
+                            </a:rPr>
+                            <m:t> ∗</m:t>
+                          </m:r>
+                          <m:r>
+                            <a:rPr lang="fr-FR" sz="1400" b="0" i="1" smtClean="0">
+                              <a:latin typeface="Cambria Math" panose="02040503050406030204" pitchFamily="18" charset="0"/>
+                            </a:rPr>
+                            <m:t>𝐻𝑇𝐿</m:t>
+                          </m:r>
+                          <m:r>
+                            <a:rPr lang="fr-FR" sz="1400" b="0" i="1" smtClean="0">
+                              <a:latin typeface="Cambria Math" panose="02040503050406030204" pitchFamily="18" charset="0"/>
+                            </a:rPr>
+                            <m:t> </m:t>
+                          </m:r>
+                          <m:r>
+                            <a:rPr lang="fr-FR" sz="1400" b="0" i="1" smtClean="0">
+                              <a:latin typeface="Cambria Math" panose="02040503050406030204" pitchFamily="18" charset="0"/>
+                            </a:rPr>
+                            <m:t>𝑚</m:t>
+                          </m:r>
+                        </m:e>
+                      </m:mr>
+                      <m:mr>
+                        <m:e>
+                          <m:r>
+                            <a:rPr lang="fr-FR" sz="1400" b="0" i="1" smtClean="0">
+                              <a:latin typeface="Cambria Math" panose="02040503050406030204" pitchFamily="18" charset="0"/>
+                            </a:rPr>
+                            <m:t>𝑜𝑏𝑠</m:t>
+                          </m:r>
+                          <m:r>
+                            <a:rPr lang="fr-FR" sz="1400" b="0" i="1" smtClean="0">
+                              <a:latin typeface="Cambria Math" panose="02040503050406030204" pitchFamily="18" charset="0"/>
+                            </a:rPr>
+                            <m:t> 1</m:t>
+                          </m:r>
+                        </m:e>
+                        <m:e>
+                          <m:r>
+                            <a:rPr lang="fr-FR" sz="1400" b="0" i="1" smtClean="0">
+                              <a:latin typeface="Cambria Math" panose="02040503050406030204" pitchFamily="18" charset="0"/>
+                            </a:rPr>
+                            <m:t>6</m:t>
+                          </m:r>
+                        </m:e>
+                        <m:e>
+                          <m:r>
+                            <a:rPr lang="fr-FR" sz="1400" b="0" i="1" smtClean="0">
+                              <a:latin typeface="Cambria Math" panose="02040503050406030204" pitchFamily="18" charset="0"/>
+                            </a:rPr>
+                            <m:t>0</m:t>
+                          </m:r>
+                        </m:e>
+                        <m:e>
+                          <m:r>
+                            <a:rPr lang="fr-FR" sz="1400" b="0" i="1" smtClean="0">
+                              <a:latin typeface="Cambria Math" panose="02040503050406030204" pitchFamily="18" charset="0"/>
+                            </a:rPr>
+                            <m:t>0</m:t>
+                          </m:r>
+                        </m:e>
+                        <m:e>
+                          <m:r>
+                            <a:rPr lang="fr-FR" sz="1400" b="0" i="1" smtClean="0">
+                              <a:latin typeface="Cambria Math" panose="02040503050406030204" pitchFamily="18" charset="0"/>
+                            </a:rPr>
+                            <m:t>2</m:t>
+                          </m:r>
+                        </m:e>
+                        <m:e>
+                          <m:r>
+                            <a:rPr lang="fr-FR" sz="1400" b="0" i="1" smtClean="0">
+                              <a:latin typeface="Cambria Math" panose="02040503050406030204" pitchFamily="18" charset="0"/>
+                            </a:rPr>
+                            <m:t>6</m:t>
+                          </m:r>
+                        </m:e>
+                        <m:e>
+                          <m:r>
+                            <a:rPr lang="fr-FR" sz="1400" b="0" i="1" smtClean="0">
+                              <a:latin typeface="Cambria Math" panose="02040503050406030204" pitchFamily="18" charset="0"/>
+                            </a:rPr>
+                            <m:t>5</m:t>
+                          </m:r>
+                        </m:e>
+                        <m:e>
+                          <m:r>
+                            <a:rPr lang="fr-FR" sz="1400" b="0" i="1" smtClean="0">
+                              <a:latin typeface="Cambria Math" panose="02040503050406030204" pitchFamily="18" charset="0"/>
+                            </a:rPr>
+                            <m:t>15</m:t>
+                          </m:r>
+                        </m:e>
+                      </m:mr>
+                      <m:mr>
+                        <m:e>
+                          <m:r>
+                            <a:rPr lang="fr-FR" sz="1400" b="0" i="1" smtClean="0">
+                              <a:latin typeface="Cambria Math" panose="02040503050406030204" pitchFamily="18" charset="0"/>
+                            </a:rPr>
+                            <m:t>𝑜𝑏𝑠</m:t>
+                          </m:r>
+                          <m:r>
+                            <a:rPr lang="fr-FR" sz="1400" b="0" i="1" smtClean="0">
+                              <a:latin typeface="Cambria Math" panose="02040503050406030204" pitchFamily="18" charset="0"/>
+                            </a:rPr>
+                            <m:t> 2</m:t>
+                          </m:r>
+                        </m:e>
+                        <m:e>
+                          <m:r>
+                            <a:rPr lang="fr-FR" sz="1400" b="0" i="1" smtClean="0">
+                              <a:latin typeface="Cambria Math" panose="02040503050406030204" pitchFamily="18" charset="0"/>
+                            </a:rPr>
+                            <m:t>5</m:t>
+                          </m:r>
+                        </m:e>
+                        <m:e>
+                          <m:r>
+                            <a:rPr lang="fr-FR" sz="1400" b="0" i="1" smtClean="0">
+                              <a:latin typeface="Cambria Math" panose="02040503050406030204" pitchFamily="18" charset="0"/>
+                            </a:rPr>
+                            <m:t>0</m:t>
+                          </m:r>
+                        </m:e>
+                        <m:e>
+                          <m:r>
+                            <a:rPr lang="fr-FR" sz="1400" b="0" i="1" smtClean="0">
+                              <a:latin typeface="Cambria Math" panose="02040503050406030204" pitchFamily="18" charset="0"/>
+                            </a:rPr>
+                            <m:t>2</m:t>
+                          </m:r>
+                        </m:e>
+                        <m:e>
+                          <m:r>
+                            <a:rPr lang="fr-FR" sz="1400" b="0" i="1" smtClean="0">
+                              <a:latin typeface="Cambria Math" panose="02040503050406030204" pitchFamily="18" charset="0"/>
+                            </a:rPr>
+                            <m:t>0</m:t>
+                          </m:r>
+                        </m:e>
+                        <m:e>
+                          <m:r>
+                            <a:rPr lang="fr-FR" sz="1400" b="0" i="1" smtClean="0">
+                              <a:latin typeface="Cambria Math" panose="02040503050406030204" pitchFamily="18" charset="0"/>
+                            </a:rPr>
+                            <m:t>6</m:t>
+                          </m:r>
+                        </m:e>
+                        <m:e>
+                          <m:r>
+                            <a:rPr lang="fr-FR" sz="1400" b="0" i="1" smtClean="0">
+                              <a:latin typeface="Cambria Math" panose="02040503050406030204" pitchFamily="18" charset="0"/>
+                            </a:rPr>
+                            <m:t>0</m:t>
+                          </m:r>
+                        </m:e>
+                        <m:e>
+                          <m:r>
+                            <a:rPr lang="fr-FR" sz="1400" b="0" i="1" smtClean="0">
+                              <a:latin typeface="Cambria Math" panose="02040503050406030204" pitchFamily="18" charset="0"/>
+                            </a:rPr>
+                            <m:t>12</m:t>
+                          </m:r>
+                        </m:e>
+                      </m:mr>
+                    </m:m>
+                  </m:oMath>
+                </a14:m>
+                <a:endParaRPr lang="fr-FR" sz="2400" b="0" dirty="0">
+                  <a:solidFill>
+                    <a:schemeClr val="accent2"/>
+                  </a:solidFill>
+                </a:endParaRPr>
+              </a:p>
+            </p:txBody>
+          </p:sp>
+        </mc:Choice>
+        <mc:Fallback>
+          <p:sp>
+            <p:nvSpPr>
+              <p:cNvPr id="13" name="TextBox 12">
+                <a:extLst>
+                  <a:ext uri="{FF2B5EF4-FFF2-40B4-BE49-F238E27FC236}">
+                    <a16:creationId xmlns:a16="http://schemas.microsoft.com/office/drawing/2014/main" id="{48006084-6055-D143-849B-619EC23CE47E}"/>
+                  </a:ext>
+                </a:extLst>
+              </p:cNvPr>
+              <p:cNvSpPr txBox="1">
+                <a:spLocks noRot="1" noChangeAspect="1" noMove="1" noResize="1" noEditPoints="1" noAdjustHandles="1" noChangeArrowheads="1" noChangeShapeType="1" noTextEdit="1"/>
+              </p:cNvSpPr>
+              <p:nvPr/>
+            </p:nvSpPr>
+            <p:spPr>
+              <a:xfrm>
+                <a:off x="254000" y="3435237"/>
+                <a:ext cx="11522400" cy="1324658"/>
+              </a:xfrm>
+              <a:prstGeom prst="rect">
+                <a:avLst/>
+              </a:prstGeom>
+              <a:blipFill>
+                <a:blip r:embed="rId3"/>
+                <a:stretch>
+                  <a:fillRect l="-1652" t="-6667" b="-8571"/>
+                </a:stretch>
+              </a:blipFill>
+            </p:spPr>
+            <p:txBody>
+              <a:bodyPr/>
+              <a:lstStyle/>
+              <a:p>
+                <a:r>
+                  <a:rPr lang="en-GB">
+                    <a:noFill/>
+                  </a:rPr>
+                  <a:t> </a:t>
+                </a:r>
+              </a:p>
+            </p:txBody>
+          </p:sp>
+        </mc:Fallback>
+      </mc:AlternateContent>
+      <p:sp>
+        <p:nvSpPr>
+          <p:cNvPr id="15" name="Rectangle 14">
+            <a:extLst>
+              <a:ext uri="{FF2B5EF4-FFF2-40B4-BE49-F238E27FC236}">
+                <a16:creationId xmlns:a16="http://schemas.microsoft.com/office/drawing/2014/main" id="{98563800-DD2A-1F4B-9317-B8F7EB7BD7AD}"/>
+              </a:ext>
+            </a:extLst>
+          </p:cNvPr>
+          <p:cNvSpPr/>
+          <p:nvPr/>
+        </p:nvSpPr>
+        <p:spPr>
+          <a:xfrm>
+            <a:off x="2523216" y="4083278"/>
+            <a:ext cx="9253184" cy="772550"/>
+          </a:xfrm>
+          <a:prstGeom prst="rect">
+            <a:avLst/>
+          </a:prstGeom>
+          <a:noFill/>
+          <a:ln>
+            <a:solidFill>
+              <a:schemeClr val="accent1"/>
+            </a:solidFill>
+          </a:ln>
+        </p:spPr>
+        <p:style>
+          <a:lnRef idx="2">
+            <a:schemeClr val="accent1">
+              <a:shade val="50000"/>
+            </a:schemeClr>
+          </a:lnRef>
+          <a:fillRef idx="1">
+            <a:schemeClr val="accent1"/>
+          </a:fillRef>
+          <a:effectRef idx="0">
+            <a:schemeClr val="accent1"/>
+          </a:effectRef>
+          <a:fontRef idx="minor">
+            <a:schemeClr val="lt1"/>
+          </a:fontRef>
+        </p:style>
+        <p:txBody>
+          <a:bodyPr rtlCol="0" anchor="ctr"/>
+          <a:lstStyle/>
+          <a:p>
+            <a:pPr algn="ctr"/>
+            <a:endParaRPr lang="en-GB"/>
+          </a:p>
+        </p:txBody>
+      </p:sp>
+      <p:sp>
+        <p:nvSpPr>
+          <p:cNvPr id="16" name="Rectangle 15">
+            <a:extLst>
+              <a:ext uri="{FF2B5EF4-FFF2-40B4-BE49-F238E27FC236}">
+                <a16:creationId xmlns:a16="http://schemas.microsoft.com/office/drawing/2014/main" id="{D7CF0E37-805D-094A-AEDC-40AB43F9E686}"/>
+              </a:ext>
+            </a:extLst>
+          </p:cNvPr>
+          <p:cNvSpPr/>
+          <p:nvPr/>
+        </p:nvSpPr>
+        <p:spPr>
+          <a:xfrm>
+            <a:off x="2523216" y="4097566"/>
+            <a:ext cx="9253184" cy="772550"/>
+          </a:xfrm>
+          <a:prstGeom prst="rect">
+            <a:avLst/>
+          </a:prstGeom>
+          <a:noFill/>
+          <a:ln>
+            <a:solidFill>
+              <a:schemeClr val="accent2">
+                <a:alpha val="90938"/>
+              </a:schemeClr>
+            </a:solidFill>
+          </a:ln>
+        </p:spPr>
+        <p:style>
+          <a:lnRef idx="2">
+            <a:schemeClr val="accent1">
+              <a:shade val="50000"/>
+            </a:schemeClr>
+          </a:lnRef>
+          <a:fillRef idx="1">
+            <a:schemeClr val="accent1"/>
+          </a:fillRef>
+          <a:effectRef idx="0">
+            <a:schemeClr val="accent1"/>
+          </a:effectRef>
+          <a:fontRef idx="minor">
+            <a:schemeClr val="lt1"/>
+          </a:fontRef>
+        </p:style>
+        <p:txBody>
+          <a:bodyPr rtlCol="0" anchor="ctr"/>
+          <a:lstStyle/>
+          <a:p>
+            <a:pPr algn="ctr"/>
+            <a:endParaRPr lang="en-GB">
+              <a:solidFill>
+                <a:schemeClr val="accent2"/>
+              </a:solidFill>
+            </a:endParaRPr>
+          </a:p>
+        </p:txBody>
+      </p:sp>
+      <mc:AlternateContent xmlns:mc="http://schemas.openxmlformats.org/markup-compatibility/2006">
+        <mc:Choice xmlns:a14="http://schemas.microsoft.com/office/drawing/2010/main" Requires="a14">
+          <p:sp>
+            <p:nvSpPr>
+              <p:cNvPr id="17" name="TextBox 16">
+                <a:extLst>
+                  <a:ext uri="{FF2B5EF4-FFF2-40B4-BE49-F238E27FC236}">
+                    <a16:creationId xmlns:a16="http://schemas.microsoft.com/office/drawing/2014/main" id="{786F1E58-9088-204A-8834-2D5B6187EECF}"/>
+                  </a:ext>
+                </a:extLst>
+              </p:cNvPr>
+              <p:cNvSpPr txBox="1"/>
+              <p:nvPr/>
+            </p:nvSpPr>
+            <p:spPr>
+              <a:xfrm>
+                <a:off x="254000" y="4996485"/>
+                <a:ext cx="5118100" cy="1540165"/>
+              </a:xfrm>
+              <a:prstGeom prst="rect">
+                <a:avLst/>
+              </a:prstGeom>
+              <a:noFill/>
+            </p:spPr>
+            <p:txBody>
+              <a:bodyPr wrap="square" lIns="0" tIns="0" rIns="0" bIns="0" rtlCol="0">
+                <a:spAutoFit/>
+              </a:bodyPr>
+              <a:lstStyle/>
+              <a:p>
+                <a:r>
+                  <a:rPr lang="fr-FR" sz="2400" dirty="0"/>
+                  <a:t>For </a:t>
+                </a:r>
+                <a:r>
+                  <a:rPr lang="fr-FR" sz="2400" dirty="0" err="1"/>
+                  <a:t>each</a:t>
+                </a:r>
+                <a:r>
+                  <a:rPr lang="fr-FR" sz="2400" dirty="0"/>
+                  <a:t> observation, a matrix </a:t>
+                </a:r>
+                <a:r>
+                  <a:rPr lang="fr-FR" sz="2400" dirty="0" err="1"/>
+                  <a:t>is</a:t>
+                </a:r>
+                <a:r>
+                  <a:rPr lang="fr-FR" sz="2400" dirty="0"/>
+                  <a:t> made</a:t>
+                </a:r>
+              </a:p>
+              <a:p>
+                <a:r>
+                  <a:rPr lang="fr-FR" sz="2400" dirty="0"/>
+                  <a:t> </a:t>
+                </a:r>
+                <a:r>
+                  <a:rPr lang="fr-FR" sz="2400" dirty="0" err="1"/>
+                  <a:t>with</a:t>
+                </a:r>
+                <a:r>
+                  <a:rPr lang="fr-FR" sz="2400" dirty="0"/>
+                  <a:t> </a:t>
+                </a:r>
+                <a:r>
+                  <a:rPr lang="fr-FR" sz="2400" dirty="0" err="1"/>
+                  <a:t>length</a:t>
+                </a:r>
+                <a:r>
+                  <a:rPr lang="fr-FR" sz="2400" dirty="0"/>
+                  <a:t>(plants) X </a:t>
+                </a:r>
+                <a:r>
+                  <a:rPr lang="fr-FR" sz="2400" dirty="0" err="1"/>
+                  <a:t>length</a:t>
+                </a:r>
+                <a:r>
+                  <a:rPr lang="fr-FR" sz="2400" dirty="0"/>
+                  <a:t>(HTL)  </a:t>
+                </a:r>
+              </a:p>
+              <a:p>
+                <a:r>
+                  <a:rPr lang="fr-FR" sz="2400" dirty="0"/>
+                  <a:t> </a:t>
+                </a:r>
+                <a14:m>
+                  <m:oMath xmlns:m="http://schemas.openxmlformats.org/officeDocument/2006/math">
+                    <m:m>
+                      <m:mPr>
+                        <m:mcs>
+                          <m:mc>
+                            <m:mcPr>
+                              <m:count m:val="3"/>
+                              <m:mcJc m:val="center"/>
+                            </m:mcPr>
+                          </m:mc>
+                        </m:mcs>
+                        <m:ctrlPr>
+                          <a:rPr lang="fr-FR" sz="1400" b="0" i="1" smtClean="0">
+                            <a:latin typeface="Cambria Math" panose="02040503050406030204" pitchFamily="18" charset="0"/>
+                          </a:rPr>
+                        </m:ctrlPr>
+                      </m:mPr>
+                      <m:mr>
+                        <m:e>
+                          <m:r>
+                            <m:rPr>
+                              <m:brk m:alnAt="7"/>
+                            </m:rPr>
+                            <a:rPr lang="fr-FR" sz="1400" b="0" i="1" smtClean="0">
+                              <a:latin typeface="Cambria Math" panose="02040503050406030204" pitchFamily="18" charset="0"/>
+                            </a:rPr>
+                            <m:t> </m:t>
+                          </m:r>
+                        </m:e>
+                        <m:e>
+                          <m:r>
+                            <a:rPr lang="fr-FR" sz="1400" b="0" i="1" smtClean="0">
+                              <a:latin typeface="Cambria Math" panose="02040503050406030204" pitchFamily="18" charset="0"/>
+                            </a:rPr>
+                            <m:t>𝑝𝑜𝑙</m:t>
+                          </m:r>
+                          <m:r>
+                            <a:rPr lang="fr-FR" sz="1400" b="0" i="1" smtClean="0">
+                              <a:latin typeface="Cambria Math" panose="02040503050406030204" pitchFamily="18" charset="0"/>
+                            </a:rPr>
+                            <m:t> </m:t>
+                          </m:r>
+                          <m:r>
+                            <a:rPr lang="fr-FR" sz="1400" b="0" i="1" smtClean="0">
+                              <a:latin typeface="Cambria Math" panose="02040503050406030204" pitchFamily="18" charset="0"/>
+                            </a:rPr>
+                            <m:t>𝑙</m:t>
+                          </m:r>
+                        </m:e>
+                        <m:e>
+                          <m:r>
+                            <a:rPr lang="fr-FR" sz="1400" b="0" i="1" smtClean="0">
+                              <a:latin typeface="Cambria Math" panose="02040503050406030204" pitchFamily="18" charset="0"/>
+                            </a:rPr>
+                            <m:t>𝑝𝑜𝑙</m:t>
+                          </m:r>
+                          <m:r>
+                            <a:rPr lang="fr-FR" sz="1400" b="0" i="1" smtClean="0">
+                              <a:latin typeface="Cambria Math" panose="02040503050406030204" pitchFamily="18" charset="0"/>
+                            </a:rPr>
+                            <m:t> </m:t>
+                          </m:r>
+                          <m:r>
+                            <a:rPr lang="fr-FR" sz="1400" b="0" i="1" smtClean="0">
+                              <a:latin typeface="Cambria Math" panose="02040503050406030204" pitchFamily="18" charset="0"/>
+                            </a:rPr>
+                            <m:t>𝑚</m:t>
+                          </m:r>
+                        </m:e>
+                      </m:mr>
+                      <m:mr>
+                        <m:e>
+                          <m:r>
+                            <a:rPr lang="fr-FR" sz="1400" b="0" i="1" smtClean="0">
+                              <a:latin typeface="Cambria Math" panose="02040503050406030204" pitchFamily="18" charset="0"/>
+                            </a:rPr>
+                            <m:t>𝑖𝑛𝑡𝑒𝑟𝑎𝑐𝑡𝑖𝑜𝑛</m:t>
+                          </m:r>
+                          <m:r>
+                            <a:rPr lang="fr-FR" sz="1400" b="0" i="1" smtClean="0">
+                              <a:latin typeface="Cambria Math" panose="02040503050406030204" pitchFamily="18" charset="0"/>
+                            </a:rPr>
+                            <m:t> </m:t>
+                          </m:r>
+                          <m:r>
+                            <a:rPr lang="fr-FR" sz="1400" b="0" i="1" smtClean="0">
+                              <a:latin typeface="Cambria Math" panose="02040503050406030204" pitchFamily="18" charset="0"/>
+                            </a:rPr>
+                            <m:t>𝑖</m:t>
+                          </m:r>
+                          <m:r>
+                            <a:rPr lang="fr-FR" sz="1400" b="0" i="1" smtClean="0">
+                              <a:latin typeface="Cambria Math" panose="02040503050406030204" pitchFamily="18" charset="0"/>
+                            </a:rPr>
+                            <m:t> </m:t>
+                          </m:r>
+                          <m:r>
+                            <a:rPr lang="fr-FR" sz="1400" b="0" i="1" smtClean="0">
+                              <a:latin typeface="Cambria Math" panose="02040503050406030204" pitchFamily="18" charset="0"/>
+                            </a:rPr>
+                            <m:t>𝑖</m:t>
+                          </m:r>
+                        </m:e>
+                        <m:e>
+                          <m:r>
+                            <a:rPr lang="fr-FR" sz="1400" b="0" i="1" smtClean="0">
+                              <a:latin typeface="Cambria Math" panose="02040503050406030204" pitchFamily="18" charset="0"/>
+                            </a:rPr>
+                            <m:t>0</m:t>
+                          </m:r>
+                        </m:e>
+                        <m:e>
+                          <m:r>
+                            <a:rPr lang="fr-FR" sz="1400" b="0" i="1" smtClean="0">
+                              <a:latin typeface="Cambria Math" panose="02040503050406030204" pitchFamily="18" charset="0"/>
+                            </a:rPr>
+                            <m:t>0</m:t>
+                          </m:r>
+                        </m:e>
+                      </m:mr>
+                      <m:mr>
+                        <m:e>
+                          <m:r>
+                            <a:rPr lang="fr-FR" sz="1400" b="0" i="1" smtClean="0">
+                              <a:latin typeface="Cambria Math" panose="02040503050406030204" pitchFamily="18" charset="0"/>
+                            </a:rPr>
+                            <m:t>𝑖𝑛𝑡𝑒𝑟𝑎𝑐𝑡𝑖𝑜𝑛</m:t>
+                          </m:r>
+                          <m:r>
+                            <a:rPr lang="fr-FR" sz="1400" b="0" i="1" smtClean="0">
+                              <a:latin typeface="Cambria Math" panose="02040503050406030204" pitchFamily="18" charset="0"/>
+                            </a:rPr>
+                            <m:t> </m:t>
+                          </m:r>
+                          <m:r>
+                            <a:rPr lang="fr-FR" sz="1400" b="0" i="1" smtClean="0">
+                              <a:latin typeface="Cambria Math" panose="02040503050406030204" pitchFamily="18" charset="0"/>
+                            </a:rPr>
+                            <m:t>𝑖</m:t>
+                          </m:r>
+                          <m:r>
+                            <a:rPr lang="fr-FR" sz="1400" b="0" i="1" smtClean="0">
+                              <a:latin typeface="Cambria Math" panose="02040503050406030204" pitchFamily="18" charset="0"/>
+                            </a:rPr>
+                            <m:t> </m:t>
+                          </m:r>
+                          <m:r>
+                            <a:rPr lang="fr-FR" sz="1400" b="0" i="1" smtClean="0">
+                              <a:latin typeface="Cambria Math" panose="02040503050406030204" pitchFamily="18" charset="0"/>
+                            </a:rPr>
+                            <m:t>𝑗</m:t>
+                          </m:r>
+                          <m:r>
+                            <a:rPr lang="fr-FR" sz="1400" b="0" i="1" smtClean="0">
+                              <a:latin typeface="Cambria Math" panose="02040503050406030204" pitchFamily="18" charset="0"/>
+                            </a:rPr>
+                            <m:t> </m:t>
+                          </m:r>
+                        </m:e>
+                        <m:e>
+                          <m:r>
+                            <a:rPr lang="fr-FR" sz="1400" b="0" i="1" smtClean="0">
+                              <a:latin typeface="Cambria Math" panose="02040503050406030204" pitchFamily="18" charset="0"/>
+                            </a:rPr>
+                            <m:t>2</m:t>
+                          </m:r>
+                        </m:e>
+                        <m:e>
+                          <m:r>
+                            <a:rPr lang="fr-FR" sz="1400" b="0" i="1" smtClean="0">
+                              <a:latin typeface="Cambria Math" panose="02040503050406030204" pitchFamily="18" charset="0"/>
+                            </a:rPr>
+                            <m:t>6</m:t>
+                          </m:r>
+                        </m:e>
+                      </m:mr>
+                      <m:mr>
+                        <m:e>
+                          <m:r>
+                            <a:rPr lang="fr-FR" sz="1400" b="0" i="1" smtClean="0">
+                              <a:latin typeface="Cambria Math" panose="02040503050406030204" pitchFamily="18" charset="0"/>
+                            </a:rPr>
+                            <m:t>𝑖𝑛𝑡𝑒𝑟𝑎𝑐𝑡𝑖𝑜𝑛</m:t>
+                          </m:r>
+                          <m:r>
+                            <a:rPr lang="fr-FR" sz="1400" b="0" i="1" smtClean="0">
+                              <a:latin typeface="Cambria Math" panose="02040503050406030204" pitchFamily="18" charset="0"/>
+                            </a:rPr>
+                            <m:t> </m:t>
+                          </m:r>
+                          <m:r>
+                            <a:rPr lang="fr-FR" sz="1400" b="0" i="1" smtClean="0">
+                              <a:latin typeface="Cambria Math" panose="02040503050406030204" pitchFamily="18" charset="0"/>
+                            </a:rPr>
+                            <m:t>𝑖</m:t>
+                          </m:r>
+                          <m:r>
+                            <a:rPr lang="fr-FR" sz="1400" b="0" i="1" smtClean="0">
+                              <a:latin typeface="Cambria Math" panose="02040503050406030204" pitchFamily="18" charset="0"/>
+                            </a:rPr>
+                            <m:t> </m:t>
+                          </m:r>
+                          <m:r>
+                            <a:rPr lang="fr-FR" sz="1400" b="0" i="1" smtClean="0">
+                              <a:latin typeface="Cambria Math" panose="02040503050406030204" pitchFamily="18" charset="0"/>
+                            </a:rPr>
+                            <m:t>𝑘</m:t>
+                          </m:r>
+                          <m:r>
+                            <a:rPr lang="fr-FR" sz="1400" b="0" i="1" smtClean="0">
+                              <a:latin typeface="Cambria Math" panose="02040503050406030204" pitchFamily="18" charset="0"/>
+                            </a:rPr>
+                            <m:t> </m:t>
+                          </m:r>
+                        </m:e>
+                        <m:e>
+                          <m:r>
+                            <a:rPr lang="fr-FR" sz="1400" b="0" i="1" smtClean="0">
+                              <a:latin typeface="Cambria Math" panose="02040503050406030204" pitchFamily="18" charset="0"/>
+                            </a:rPr>
+                            <m:t>5</m:t>
+                          </m:r>
+                        </m:e>
+                        <m:e>
+                          <m:r>
+                            <a:rPr lang="fr-FR" sz="1400" b="0" i="1" smtClean="0">
+                              <a:latin typeface="Cambria Math" panose="02040503050406030204" pitchFamily="18" charset="0"/>
+                            </a:rPr>
+                            <m:t>15</m:t>
+                          </m:r>
+                        </m:e>
+                      </m:mr>
+                    </m:m>
+                  </m:oMath>
+                </a14:m>
+                <a:endParaRPr lang="fr-FR" sz="2400" b="0" dirty="0">
+                  <a:solidFill>
+                    <a:schemeClr val="accent2"/>
+                  </a:solidFill>
+                </a:endParaRPr>
+              </a:p>
+            </p:txBody>
+          </p:sp>
+        </mc:Choice>
+        <mc:Fallback>
+          <p:sp>
+            <p:nvSpPr>
+              <p:cNvPr id="17" name="TextBox 16">
+                <a:extLst>
+                  <a:ext uri="{FF2B5EF4-FFF2-40B4-BE49-F238E27FC236}">
+                    <a16:creationId xmlns:a16="http://schemas.microsoft.com/office/drawing/2014/main" id="{786F1E58-9088-204A-8834-2D5B6187EECF}"/>
+                  </a:ext>
+                </a:extLst>
+              </p:cNvPr>
+              <p:cNvSpPr txBox="1">
+                <a:spLocks noRot="1" noChangeAspect="1" noMove="1" noResize="1" noEditPoints="1" noAdjustHandles="1" noChangeArrowheads="1" noChangeShapeType="1" noTextEdit="1"/>
+              </p:cNvSpPr>
+              <p:nvPr/>
+            </p:nvSpPr>
+            <p:spPr>
+              <a:xfrm>
+                <a:off x="254000" y="4996485"/>
+                <a:ext cx="5118100" cy="1540165"/>
+              </a:xfrm>
+              <a:prstGeom prst="rect">
+                <a:avLst/>
+              </a:prstGeom>
+              <a:blipFill>
+                <a:blip r:embed="rId4"/>
+                <a:stretch>
+                  <a:fillRect l="-3722" t="-6557" b="-7377"/>
+                </a:stretch>
+              </a:blipFill>
+            </p:spPr>
+            <p:txBody>
+              <a:bodyPr/>
+              <a:lstStyle/>
+              <a:p>
+                <a:r>
+                  <a:rPr lang="en-GB">
+                    <a:noFill/>
+                  </a:rPr>
+                  <a:t> </a:t>
+                </a:r>
+              </a:p>
+            </p:txBody>
+          </p:sp>
+        </mc:Fallback>
+      </mc:AlternateContent>
+      <mc:AlternateContent xmlns:mc="http://schemas.openxmlformats.org/markup-compatibility/2006">
+        <mc:Choice xmlns:a14="http://schemas.microsoft.com/office/drawing/2010/main" Requires="a14">
+          <p:sp>
+            <p:nvSpPr>
+              <p:cNvPr id="18" name="TextBox 17">
+                <a:extLst>
+                  <a:ext uri="{FF2B5EF4-FFF2-40B4-BE49-F238E27FC236}">
+                    <a16:creationId xmlns:a16="http://schemas.microsoft.com/office/drawing/2014/main" id="{DAC73C58-05AB-A147-8913-71ABCB1EF026}"/>
+                  </a:ext>
+                </a:extLst>
+              </p:cNvPr>
+              <p:cNvSpPr txBox="1"/>
+              <p:nvPr/>
+            </p:nvSpPr>
+            <p:spPr>
+              <a:xfrm>
+                <a:off x="7494852" y="5216271"/>
+                <a:ext cx="4398432" cy="1414362"/>
+              </a:xfrm>
+              <a:prstGeom prst="rect">
+                <a:avLst/>
+              </a:prstGeom>
+              <a:noFill/>
+            </p:spPr>
+            <p:txBody>
+              <a:bodyPr wrap="square">
+                <a:spAutoFit/>
+              </a:bodyPr>
+              <a:lstStyle/>
+              <a:p>
+                <a:pPr algn="ctr"/>
+                <a14:m>
+                  <m:oMathPara xmlns:m="http://schemas.openxmlformats.org/officeDocument/2006/math">
+                    <m:oMathParaPr>
+                      <m:jc m:val="centerGroup"/>
+                    </m:oMathParaPr>
+                    <m:oMath xmlns:m="http://schemas.openxmlformats.org/officeDocument/2006/math">
+                      <m:m>
+                        <m:mPr>
+                          <m:mcs>
+                            <m:mc>
+                              <m:mcPr>
+                                <m:count m:val="3"/>
+                                <m:mcJc m:val="center"/>
+                              </m:mcPr>
+                            </m:mc>
+                          </m:mcs>
+                          <m:ctrlPr>
+                            <a:rPr lang="fr-FR" sz="1800" b="0" i="1" smtClean="0">
+                              <a:solidFill>
+                                <a:schemeClr val="accent6"/>
+                              </a:solidFill>
+                              <a:latin typeface="Cambria Math" panose="02040503050406030204" pitchFamily="18" charset="0"/>
+                            </a:rPr>
+                          </m:ctrlPr>
+                        </m:mPr>
+                        <m:mr>
+                          <m:e>
+                            <m:func>
+                              <m:funcPr>
+                                <m:ctrlPr>
+                                  <a:rPr lang="fr-FR" sz="1800" b="0" i="1" smtClean="0">
+                                    <a:solidFill>
+                                      <a:schemeClr val="accent6"/>
+                                    </a:solidFill>
+                                    <a:latin typeface="Cambria Math" panose="02040503050406030204" pitchFamily="18" charset="0"/>
+                                  </a:rPr>
+                                </m:ctrlPr>
+                              </m:funcPr>
+                              <m:fName>
+                                <m:r>
+                                  <m:rPr>
+                                    <m:sty m:val="p"/>
+                                  </m:rPr>
+                                  <a:rPr lang="fr-FR" sz="1800" b="0" i="0" smtClean="0">
+                                    <a:solidFill>
+                                      <a:schemeClr val="accent6"/>
+                                    </a:solidFill>
+                                    <a:latin typeface="Cambria Math" panose="02040503050406030204" pitchFamily="18" charset="0"/>
+                                  </a:rPr>
+                                  <m:t>ln</m:t>
+                                </m:r>
+                              </m:fName>
+                              <m:e>
+                                <m:d>
+                                  <m:dPr>
+                                    <m:ctrlPr>
+                                      <a:rPr lang="fr-FR" sz="1800" b="0" i="1" smtClean="0">
+                                        <a:solidFill>
+                                          <a:schemeClr val="accent6"/>
+                                        </a:solidFill>
+                                        <a:latin typeface="Cambria Math" panose="02040503050406030204" pitchFamily="18" charset="0"/>
+                                      </a:rPr>
+                                    </m:ctrlPr>
+                                  </m:dPr>
+                                  <m:e>
+                                    <m:sSub>
+                                      <m:sSubPr>
+                                        <m:ctrlPr>
+                                          <a:rPr lang="fr-FR" i="1" smtClean="0">
+                                            <a:solidFill>
+                                              <a:schemeClr val="accent6"/>
+                                            </a:solidFill>
+                                            <a:latin typeface="Cambria Math" panose="02040503050406030204" pitchFamily="18" charset="0"/>
+                                            <a:ea typeface="Cambria Math" panose="02040503050406030204" pitchFamily="18" charset="0"/>
+                                          </a:rPr>
+                                        </m:ctrlPr>
+                                      </m:sSubPr>
+                                      <m:e>
+                                        <m:r>
+                                          <a:rPr lang="fr-FR" i="1">
+                                            <a:solidFill>
+                                              <a:schemeClr val="accent6"/>
+                                            </a:solidFill>
+                                            <a:latin typeface="Cambria Math" panose="02040503050406030204" pitchFamily="18" charset="0"/>
+                                            <a:ea typeface="Cambria Math" panose="02040503050406030204" pitchFamily="18" charset="0"/>
+                                          </a:rPr>
+                                          <m:t>𝛽</m:t>
+                                        </m:r>
+                                      </m:e>
+                                      <m:sub>
+                                        <m:r>
+                                          <a:rPr lang="fr-FR" b="0" i="1" smtClean="0">
+                                            <a:solidFill>
+                                              <a:schemeClr val="accent6"/>
+                                            </a:solidFill>
+                                            <a:latin typeface="Cambria Math" panose="02040503050406030204" pitchFamily="18" charset="0"/>
+                                            <a:ea typeface="Cambria Math" panose="02040503050406030204" pitchFamily="18" charset="0"/>
+                                          </a:rPr>
+                                          <m:t>𝑖𝑖</m:t>
+                                        </m:r>
+                                        <m:r>
+                                          <a:rPr lang="fr-FR" b="0" i="1" smtClean="0">
+                                            <a:solidFill>
+                                              <a:schemeClr val="accent6"/>
+                                            </a:solidFill>
+                                            <a:latin typeface="Cambria Math" panose="02040503050406030204" pitchFamily="18" charset="0"/>
+                                            <a:ea typeface="Cambria Math" panose="02040503050406030204" pitchFamily="18" charset="0"/>
+                                          </a:rPr>
+                                          <m:t>𝑙</m:t>
+                                        </m:r>
+                                      </m:sub>
+                                    </m:sSub>
+                                  </m:e>
+                                </m:d>
+                              </m:e>
+                            </m:func>
+                            <m:r>
+                              <m:rPr>
+                                <m:brk m:alnAt="7"/>
+                              </m:rPr>
+                              <a:rPr lang="fr-FR" sz="1800" b="0" i="1" smtClean="0">
+                                <a:solidFill>
+                                  <a:schemeClr val="accent6"/>
+                                </a:solidFill>
+                                <a:latin typeface="Cambria Math" panose="02040503050406030204" pitchFamily="18" charset="0"/>
+                                <a:ea typeface="Cambria Math" panose="02040503050406030204" pitchFamily="18" charset="0"/>
+                              </a:rPr>
+                              <m:t>∗</m:t>
+                            </m:r>
+                            <m:r>
+                              <a:rPr lang="fr-FR" sz="1800" b="0" i="1" smtClean="0">
+                                <a:solidFill>
+                                  <a:schemeClr val="accent6"/>
+                                </a:solidFill>
+                                <a:latin typeface="Cambria Math" panose="02040503050406030204" pitchFamily="18" charset="0"/>
+                                <a:ea typeface="Cambria Math" panose="02040503050406030204" pitchFamily="18" charset="0"/>
+                              </a:rPr>
+                              <m:t>0</m:t>
+                            </m:r>
+                          </m:e>
+                          <m:e>
+                            <m:r>
+                              <a:rPr lang="fr-FR" sz="1800" b="0" i="1" smtClean="0">
+                                <a:solidFill>
+                                  <a:schemeClr val="accent6"/>
+                                </a:solidFill>
+                                <a:latin typeface="Cambria Math" panose="02040503050406030204" pitchFamily="18" charset="0"/>
+                                <a:ea typeface="Cambria Math" panose="02040503050406030204" pitchFamily="18" charset="0"/>
+                              </a:rPr>
+                              <m:t>+</m:t>
+                            </m:r>
+                            <m:r>
+                              <a:rPr lang="fr-FR" sz="1800" b="0" i="1" smtClean="0">
+                                <a:solidFill>
+                                  <a:schemeClr val="accent6"/>
+                                </a:solidFill>
+                                <a:latin typeface="Cambria Math" panose="02040503050406030204" pitchFamily="18" charset="0"/>
+                                <a:ea typeface="Cambria Math" panose="02040503050406030204" pitchFamily="18" charset="0"/>
+                              </a:rPr>
+                              <m:t>  </m:t>
+                            </m:r>
+                            <m:r>
+                              <a:rPr lang="fr-FR" sz="1800" b="0" i="1" smtClean="0">
+                                <a:solidFill>
+                                  <a:schemeClr val="accent6"/>
+                                </a:solidFill>
+                                <a:latin typeface="Cambria Math" panose="02040503050406030204" pitchFamily="18" charset="0"/>
+                              </a:rPr>
+                              <m:t>𝑙</m:t>
+                            </m:r>
+                            <m:func>
+                              <m:funcPr>
+                                <m:ctrlPr>
+                                  <a:rPr lang="fr-FR" sz="1800" b="0" i="1" smtClean="0">
+                                    <a:solidFill>
+                                      <a:schemeClr val="accent6"/>
+                                    </a:solidFill>
+                                    <a:latin typeface="Cambria Math" panose="02040503050406030204" pitchFamily="18" charset="0"/>
+                                  </a:rPr>
+                                </m:ctrlPr>
+                              </m:funcPr>
+                              <m:fName>
+                                <m:r>
+                                  <m:rPr>
+                                    <m:sty m:val="p"/>
+                                    <m:brk m:alnAt="7"/>
+                                  </m:rPr>
+                                  <a:rPr lang="fr-FR" sz="1800" b="0" i="0" smtClean="0">
+                                    <a:solidFill>
+                                      <a:schemeClr val="accent6"/>
+                                    </a:solidFill>
+                                    <a:latin typeface="Cambria Math" panose="02040503050406030204" pitchFamily="18" charset="0"/>
+                                  </a:rPr>
+                                  <m:t>n</m:t>
+                                </m:r>
+                              </m:fName>
+                              <m:e>
+                                <m:d>
+                                  <m:dPr>
+                                    <m:ctrlPr>
+                                      <a:rPr lang="fr-FR" sz="1800" b="0" i="1" smtClean="0">
+                                        <a:solidFill>
+                                          <a:schemeClr val="accent6"/>
+                                        </a:solidFill>
+                                        <a:latin typeface="Cambria Math" panose="02040503050406030204" pitchFamily="18" charset="0"/>
+                                      </a:rPr>
+                                    </m:ctrlPr>
+                                  </m:dPr>
+                                  <m:e>
+                                    <m:sSub>
+                                      <m:sSubPr>
+                                        <m:ctrlPr>
+                                          <a:rPr lang="fr-FR" i="1" smtClean="0">
+                                            <a:solidFill>
+                                              <a:schemeClr val="accent6"/>
+                                            </a:solidFill>
+                                            <a:latin typeface="Cambria Math" panose="02040503050406030204" pitchFamily="18" charset="0"/>
+                                            <a:ea typeface="Cambria Math" panose="02040503050406030204" pitchFamily="18" charset="0"/>
+                                          </a:rPr>
+                                        </m:ctrlPr>
+                                      </m:sSubPr>
+                                      <m:e>
+                                        <m:r>
+                                          <a:rPr lang="fr-FR" i="1">
+                                            <a:solidFill>
+                                              <a:schemeClr val="accent6"/>
+                                            </a:solidFill>
+                                            <a:latin typeface="Cambria Math" panose="02040503050406030204" pitchFamily="18" charset="0"/>
+                                            <a:ea typeface="Cambria Math" panose="02040503050406030204" pitchFamily="18" charset="0"/>
+                                          </a:rPr>
+                                          <m:t>𝛽</m:t>
+                                        </m:r>
+                                      </m:e>
+                                      <m:sub>
+                                        <m:r>
+                                          <a:rPr lang="fr-FR" b="0" i="1" smtClean="0">
+                                            <a:solidFill>
+                                              <a:schemeClr val="accent6"/>
+                                            </a:solidFill>
+                                            <a:latin typeface="Cambria Math" panose="02040503050406030204" pitchFamily="18" charset="0"/>
+                                            <a:ea typeface="Cambria Math" panose="02040503050406030204" pitchFamily="18" charset="0"/>
+                                          </a:rPr>
+                                          <m:t>𝑖𝑖</m:t>
+                                        </m:r>
+                                        <m:r>
+                                          <a:rPr lang="fr-FR" b="0" i="1" smtClean="0">
+                                            <a:solidFill>
+                                              <a:schemeClr val="accent6"/>
+                                            </a:solidFill>
+                                            <a:latin typeface="Cambria Math" panose="02040503050406030204" pitchFamily="18" charset="0"/>
+                                            <a:ea typeface="Cambria Math" panose="02040503050406030204" pitchFamily="18" charset="0"/>
+                                          </a:rPr>
+                                          <m:t>𝑚</m:t>
+                                        </m:r>
+                                      </m:sub>
+                                    </m:sSub>
+                                  </m:e>
+                                </m:d>
+                              </m:e>
+                            </m:func>
+                            <m:r>
+                              <m:rPr>
+                                <m:brk m:alnAt="7"/>
+                              </m:rPr>
+                              <a:rPr lang="fr-FR" sz="1800" b="0" i="1" smtClean="0">
+                                <a:solidFill>
+                                  <a:schemeClr val="accent6"/>
+                                </a:solidFill>
+                                <a:latin typeface="Cambria Math" panose="02040503050406030204" pitchFamily="18" charset="0"/>
+                                <a:ea typeface="Cambria Math" panose="02040503050406030204" pitchFamily="18" charset="0"/>
+                              </a:rPr>
+                              <m:t>∗</m:t>
+                            </m:r>
+                            <m:r>
+                              <a:rPr lang="fr-FR" sz="1800" b="0" i="1" smtClean="0">
+                                <a:solidFill>
+                                  <a:schemeClr val="accent6"/>
+                                </a:solidFill>
+                                <a:latin typeface="Cambria Math" panose="02040503050406030204" pitchFamily="18" charset="0"/>
+                                <a:ea typeface="Cambria Math" panose="02040503050406030204" pitchFamily="18" charset="0"/>
+                              </a:rPr>
+                              <m:t>0</m:t>
+                            </m:r>
+                          </m:e>
+                          <m:e>
+                            <m:r>
+                              <a:rPr lang="fr-FR" sz="1800" b="0" i="1" smtClean="0">
+                                <a:solidFill>
+                                  <a:schemeClr val="accent6"/>
+                                </a:solidFill>
+                                <a:latin typeface="Cambria Math" panose="02040503050406030204" pitchFamily="18" charset="0"/>
+                                <a:ea typeface="Cambria Math" panose="02040503050406030204" pitchFamily="18" charset="0"/>
+                              </a:rPr>
+                              <m:t> </m:t>
+                            </m:r>
+                          </m:e>
+                        </m:mr>
+                      </m:m>
+                    </m:oMath>
+                  </m:oMathPara>
+                </a14:m>
+                <a:endParaRPr lang="fr-FR" sz="1800" b="0" baseline="-25000" dirty="0">
+                  <a:solidFill>
+                    <a:schemeClr val="tx1"/>
+                  </a:solidFill>
+                </a:endParaRPr>
+              </a:p>
+              <a:p>
+                <a:pPr algn="ctr"/>
+                <a:endParaRPr lang="fr-FR" i="1" dirty="0">
+                  <a:solidFill>
+                    <a:schemeClr val="accent6">
+                      <a:lumMod val="50000"/>
+                    </a:schemeClr>
+                  </a:solidFill>
+                  <a:latin typeface="Cambria Math" panose="02040503050406030204" pitchFamily="18" charset="0"/>
+                </a:endParaRPr>
+              </a:p>
+              <a:p>
+                <a:pPr algn="ctr"/>
+                <a14:m>
+                  <m:oMathPara xmlns:m="http://schemas.openxmlformats.org/officeDocument/2006/math">
+                    <m:oMathParaPr>
+                      <m:jc m:val="centerGroup"/>
+                    </m:oMathParaPr>
+                    <m:oMath xmlns:m="http://schemas.openxmlformats.org/officeDocument/2006/math">
+                      <m:m>
+                        <m:mPr>
+                          <m:mcs>
+                            <m:mc>
+                              <m:mcPr>
+                                <m:count m:val="2"/>
+                                <m:mcJc m:val="center"/>
+                              </m:mcPr>
+                            </m:mc>
+                          </m:mcs>
+                          <m:ctrlPr>
+                            <a:rPr lang="fr-FR" i="1" smtClean="0">
+                              <a:solidFill>
+                                <a:schemeClr val="accent6">
+                                  <a:lumMod val="50000"/>
+                                </a:schemeClr>
+                              </a:solidFill>
+                              <a:latin typeface="Cambria Math" panose="02040503050406030204" pitchFamily="18" charset="0"/>
+                            </a:rPr>
+                          </m:ctrlPr>
+                        </m:mPr>
+                        <m:mr>
+                          <m:e>
+                            <m:func>
+                              <m:funcPr>
+                                <m:ctrlPr>
+                                  <a:rPr lang="fr-FR" i="1">
+                                    <a:solidFill>
+                                      <a:schemeClr val="accent6">
+                                        <a:lumMod val="50000"/>
+                                      </a:schemeClr>
+                                    </a:solidFill>
+                                    <a:latin typeface="Cambria Math" panose="02040503050406030204" pitchFamily="18" charset="0"/>
+                                  </a:rPr>
+                                </m:ctrlPr>
+                              </m:funcPr>
+                              <m:fName>
+                                <m:r>
+                                  <m:rPr>
+                                    <m:sty m:val="p"/>
+                                  </m:rPr>
+                                  <a:rPr lang="fr-FR">
+                                    <a:solidFill>
+                                      <a:schemeClr val="accent6">
+                                        <a:lumMod val="50000"/>
+                                      </a:schemeClr>
+                                    </a:solidFill>
+                                    <a:latin typeface="Cambria Math" panose="02040503050406030204" pitchFamily="18" charset="0"/>
+                                  </a:rPr>
+                                  <m:t>ln</m:t>
+                                </m:r>
+                              </m:fName>
+                              <m:e>
+                                <m:d>
+                                  <m:dPr>
+                                    <m:ctrlPr>
+                                      <a:rPr lang="fr-FR" i="1">
+                                        <a:solidFill>
+                                          <a:schemeClr val="accent6">
+                                            <a:lumMod val="50000"/>
+                                          </a:schemeClr>
+                                        </a:solidFill>
+                                        <a:latin typeface="Cambria Math" panose="02040503050406030204" pitchFamily="18" charset="0"/>
+                                      </a:rPr>
+                                    </m:ctrlPr>
+                                  </m:dPr>
+                                  <m:e>
+                                    <m:sSub>
+                                      <m:sSubPr>
+                                        <m:ctrlPr>
+                                          <a:rPr lang="fr-FR" i="1">
+                                            <a:solidFill>
+                                              <a:schemeClr val="accent6">
+                                                <a:lumMod val="50000"/>
+                                              </a:schemeClr>
+                                            </a:solidFill>
+                                            <a:latin typeface="Cambria Math" panose="02040503050406030204" pitchFamily="18" charset="0"/>
+                                            <a:ea typeface="Cambria Math" panose="02040503050406030204" pitchFamily="18" charset="0"/>
+                                          </a:rPr>
+                                        </m:ctrlPr>
+                                      </m:sSubPr>
+                                      <m:e>
+                                        <m:r>
+                                          <a:rPr lang="fr-FR" i="1">
+                                            <a:solidFill>
+                                              <a:schemeClr val="accent6">
+                                                <a:lumMod val="50000"/>
+                                              </a:schemeClr>
+                                            </a:solidFill>
+                                            <a:latin typeface="Cambria Math" panose="02040503050406030204" pitchFamily="18" charset="0"/>
+                                            <a:ea typeface="Cambria Math" panose="02040503050406030204" pitchFamily="18" charset="0"/>
+                                          </a:rPr>
+                                          <m:t>𝛽</m:t>
+                                        </m:r>
+                                      </m:e>
+                                      <m:sub>
+                                        <m:r>
+                                          <a:rPr lang="fr-FR" i="1">
+                                            <a:solidFill>
+                                              <a:schemeClr val="accent6">
+                                                <a:lumMod val="50000"/>
+                                              </a:schemeClr>
+                                            </a:solidFill>
+                                            <a:latin typeface="Cambria Math" panose="02040503050406030204" pitchFamily="18" charset="0"/>
+                                            <a:ea typeface="Cambria Math" panose="02040503050406030204" pitchFamily="18" charset="0"/>
+                                          </a:rPr>
+                                          <m:t>𝑖</m:t>
+                                        </m:r>
+                                        <m:r>
+                                          <a:rPr lang="fr-FR" b="0" i="1" smtClean="0">
+                                            <a:solidFill>
+                                              <a:schemeClr val="accent6">
+                                                <a:lumMod val="50000"/>
+                                              </a:schemeClr>
+                                            </a:solidFill>
+                                            <a:latin typeface="Cambria Math" panose="02040503050406030204" pitchFamily="18" charset="0"/>
+                                            <a:ea typeface="Cambria Math" panose="02040503050406030204" pitchFamily="18" charset="0"/>
+                                          </a:rPr>
+                                          <m:t>𝑗</m:t>
+                                        </m:r>
+                                        <m:r>
+                                          <a:rPr lang="fr-FR" b="0" i="1" smtClean="0">
+                                            <a:solidFill>
+                                              <a:schemeClr val="accent6">
+                                                <a:lumMod val="50000"/>
+                                              </a:schemeClr>
+                                            </a:solidFill>
+                                            <a:latin typeface="Cambria Math" panose="02040503050406030204" pitchFamily="18" charset="0"/>
+                                            <a:ea typeface="Cambria Math" panose="02040503050406030204" pitchFamily="18" charset="0"/>
+                                          </a:rPr>
+                                          <m:t>𝑙</m:t>
+                                        </m:r>
+                                      </m:sub>
+                                    </m:sSub>
+                                  </m:e>
+                                </m:d>
+                              </m:e>
+                            </m:func>
+                            <m:r>
+                              <m:rPr>
+                                <m:brk m:alnAt="7"/>
+                              </m:rPr>
+                              <a:rPr lang="fr-FR" b="0" i="1" smtClean="0">
+                                <a:solidFill>
+                                  <a:schemeClr val="accent6">
+                                    <a:lumMod val="50000"/>
+                                  </a:schemeClr>
+                                </a:solidFill>
+                                <a:latin typeface="Cambria Math" panose="02040503050406030204" pitchFamily="18" charset="0"/>
+                                <a:ea typeface="Cambria Math" panose="02040503050406030204" pitchFamily="18" charset="0"/>
+                              </a:rPr>
+                              <m:t>∗</m:t>
+                            </m:r>
+                            <m:r>
+                              <a:rPr lang="fr-FR" b="0" i="1" smtClean="0">
+                                <a:solidFill>
+                                  <a:schemeClr val="accent6">
+                                    <a:lumMod val="50000"/>
+                                  </a:schemeClr>
+                                </a:solidFill>
+                                <a:latin typeface="Cambria Math" panose="02040503050406030204" pitchFamily="18" charset="0"/>
+                                <a:ea typeface="Cambria Math" panose="02040503050406030204" pitchFamily="18" charset="0"/>
+                              </a:rPr>
+                              <m:t>2 +</m:t>
+                            </m:r>
+                          </m:e>
+                          <m:e>
+                            <m:r>
+                              <a:rPr lang="fr-FR" i="1">
+                                <a:solidFill>
+                                  <a:schemeClr val="accent6">
+                                    <a:lumMod val="50000"/>
+                                  </a:schemeClr>
+                                </a:solidFill>
+                                <a:latin typeface="Cambria Math" panose="02040503050406030204" pitchFamily="18" charset="0"/>
+                              </a:rPr>
+                              <m:t>𝑙</m:t>
+                            </m:r>
+                            <m:func>
+                              <m:funcPr>
+                                <m:ctrlPr>
+                                  <a:rPr lang="fr-FR" i="1">
+                                    <a:solidFill>
+                                      <a:schemeClr val="accent6">
+                                        <a:lumMod val="50000"/>
+                                      </a:schemeClr>
+                                    </a:solidFill>
+                                    <a:latin typeface="Cambria Math" panose="02040503050406030204" pitchFamily="18" charset="0"/>
+                                  </a:rPr>
+                                </m:ctrlPr>
+                              </m:funcPr>
+                              <m:fName>
+                                <m:r>
+                                  <m:rPr>
+                                    <m:sty m:val="p"/>
+                                    <m:brk m:alnAt="7"/>
+                                  </m:rPr>
+                                  <a:rPr lang="fr-FR">
+                                    <a:solidFill>
+                                      <a:schemeClr val="accent6">
+                                        <a:lumMod val="50000"/>
+                                      </a:schemeClr>
+                                    </a:solidFill>
+                                    <a:latin typeface="Cambria Math" panose="02040503050406030204" pitchFamily="18" charset="0"/>
+                                  </a:rPr>
+                                  <m:t>n</m:t>
+                                </m:r>
+                              </m:fName>
+                              <m:e>
+                                <m:d>
+                                  <m:dPr>
+                                    <m:ctrlPr>
+                                      <a:rPr lang="fr-FR" i="1">
+                                        <a:solidFill>
+                                          <a:schemeClr val="accent6">
+                                            <a:lumMod val="50000"/>
+                                          </a:schemeClr>
+                                        </a:solidFill>
+                                        <a:latin typeface="Cambria Math" panose="02040503050406030204" pitchFamily="18" charset="0"/>
+                                      </a:rPr>
+                                    </m:ctrlPr>
+                                  </m:dPr>
+                                  <m:e>
+                                    <m:sSub>
+                                      <m:sSubPr>
+                                        <m:ctrlPr>
+                                          <a:rPr lang="fr-FR" i="1">
+                                            <a:solidFill>
+                                              <a:schemeClr val="accent6">
+                                                <a:lumMod val="50000"/>
+                                              </a:schemeClr>
+                                            </a:solidFill>
+                                            <a:latin typeface="Cambria Math" panose="02040503050406030204" pitchFamily="18" charset="0"/>
+                                            <a:ea typeface="Cambria Math" panose="02040503050406030204" pitchFamily="18" charset="0"/>
+                                          </a:rPr>
+                                        </m:ctrlPr>
+                                      </m:sSubPr>
+                                      <m:e>
+                                        <m:r>
+                                          <a:rPr lang="fr-FR" i="1">
+                                            <a:solidFill>
+                                              <a:schemeClr val="accent6">
+                                                <a:lumMod val="50000"/>
+                                              </a:schemeClr>
+                                            </a:solidFill>
+                                            <a:latin typeface="Cambria Math" panose="02040503050406030204" pitchFamily="18" charset="0"/>
+                                            <a:ea typeface="Cambria Math" panose="02040503050406030204" pitchFamily="18" charset="0"/>
+                                          </a:rPr>
+                                          <m:t>𝛽</m:t>
+                                        </m:r>
+                                      </m:e>
+                                      <m:sub>
+                                        <m:r>
+                                          <a:rPr lang="fr-FR" i="1">
+                                            <a:solidFill>
+                                              <a:schemeClr val="accent6">
+                                                <a:lumMod val="50000"/>
+                                              </a:schemeClr>
+                                            </a:solidFill>
+                                            <a:latin typeface="Cambria Math" panose="02040503050406030204" pitchFamily="18" charset="0"/>
+                                            <a:ea typeface="Cambria Math" panose="02040503050406030204" pitchFamily="18" charset="0"/>
+                                          </a:rPr>
+                                          <m:t>𝑖𝑗</m:t>
+                                        </m:r>
+                                        <m:r>
+                                          <a:rPr lang="fr-FR" b="0" i="1" smtClean="0">
+                                            <a:solidFill>
+                                              <a:schemeClr val="accent6">
+                                                <a:lumMod val="50000"/>
+                                              </a:schemeClr>
+                                            </a:solidFill>
+                                            <a:latin typeface="Cambria Math" panose="02040503050406030204" pitchFamily="18" charset="0"/>
+                                            <a:ea typeface="Cambria Math" panose="02040503050406030204" pitchFamily="18" charset="0"/>
+                                          </a:rPr>
+                                          <m:t>𝑚</m:t>
+                                        </m:r>
+                                      </m:sub>
+                                    </m:sSub>
+                                  </m:e>
+                                </m:d>
+                              </m:e>
+                            </m:func>
+                            <m:r>
+                              <m:rPr>
+                                <m:brk m:alnAt="7"/>
+                              </m:rPr>
+                              <a:rPr lang="fr-FR" b="0" i="1" smtClean="0">
+                                <a:solidFill>
+                                  <a:schemeClr val="accent6">
+                                    <a:lumMod val="50000"/>
+                                  </a:schemeClr>
+                                </a:solidFill>
+                                <a:latin typeface="Cambria Math" panose="02040503050406030204" pitchFamily="18" charset="0"/>
+                                <a:ea typeface="Cambria Math" panose="02040503050406030204" pitchFamily="18" charset="0"/>
+                              </a:rPr>
+                              <m:t>∗</m:t>
+                            </m:r>
+                            <m:r>
+                              <a:rPr lang="fr-FR" b="0" i="1" smtClean="0">
+                                <a:solidFill>
+                                  <a:schemeClr val="accent6">
+                                    <a:lumMod val="50000"/>
+                                  </a:schemeClr>
+                                </a:solidFill>
+                                <a:latin typeface="Cambria Math" panose="02040503050406030204" pitchFamily="18" charset="0"/>
+                                <a:ea typeface="Cambria Math" panose="02040503050406030204" pitchFamily="18" charset="0"/>
+                              </a:rPr>
+                              <m:t>6</m:t>
+                            </m:r>
+                          </m:e>
+                        </m:mr>
+                      </m:m>
+                    </m:oMath>
+                  </m:oMathPara>
+                </a14:m>
+                <a:endParaRPr lang="fr-FR" dirty="0">
+                  <a:solidFill>
+                    <a:schemeClr val="accent6">
+                      <a:lumMod val="50000"/>
+                    </a:schemeClr>
+                  </a:solidFill>
+                  <a:ea typeface="Cambria Math" panose="02040503050406030204" pitchFamily="18" charset="0"/>
+                </a:endParaRPr>
+              </a:p>
+              <a:p>
+                <a:pPr algn="ctr"/>
+                <a:endParaRPr lang="fr-FR" sz="1800" b="0" baseline="-25000" dirty="0">
+                  <a:solidFill>
+                    <a:schemeClr val="tx1"/>
+                  </a:solidFill>
+                </a:endParaRPr>
+              </a:p>
+              <a:p>
+                <a:pPr algn="ctr"/>
+                <a14:m>
+                  <m:oMathPara xmlns:m="http://schemas.openxmlformats.org/officeDocument/2006/math">
+                    <m:oMathParaPr>
+                      <m:jc m:val="centerGroup"/>
+                    </m:oMathParaPr>
+                    <m:oMath xmlns:m="http://schemas.openxmlformats.org/officeDocument/2006/math">
+                      <m:m>
+                        <m:mPr>
+                          <m:mcs>
+                            <m:mc>
+                              <m:mcPr>
+                                <m:count m:val="2"/>
+                                <m:mcJc m:val="center"/>
+                              </m:mcPr>
+                            </m:mc>
+                          </m:mcs>
+                          <m:ctrlPr>
+                            <a:rPr lang="fr-FR" i="1" smtClean="0">
+                              <a:solidFill>
+                                <a:srgbClr val="7030A0"/>
+                              </a:solidFill>
+                              <a:latin typeface="Cambria Math" panose="02040503050406030204" pitchFamily="18" charset="0"/>
+                            </a:rPr>
+                          </m:ctrlPr>
+                        </m:mPr>
+                        <m:mr>
+                          <m:e>
+                            <m:func>
+                              <m:funcPr>
+                                <m:ctrlPr>
+                                  <a:rPr lang="fr-FR" i="1">
+                                    <a:solidFill>
+                                      <a:srgbClr val="7030A0"/>
+                                    </a:solidFill>
+                                    <a:latin typeface="Cambria Math" panose="02040503050406030204" pitchFamily="18" charset="0"/>
+                                  </a:rPr>
+                                </m:ctrlPr>
+                              </m:funcPr>
+                              <m:fName>
+                                <m:r>
+                                  <m:rPr>
+                                    <m:sty m:val="p"/>
+                                  </m:rPr>
+                                  <a:rPr lang="fr-FR">
+                                    <a:solidFill>
+                                      <a:srgbClr val="7030A0"/>
+                                    </a:solidFill>
+                                    <a:latin typeface="Cambria Math" panose="02040503050406030204" pitchFamily="18" charset="0"/>
+                                  </a:rPr>
+                                  <m:t>ln</m:t>
+                                </m:r>
+                              </m:fName>
+                              <m:e>
+                                <m:d>
+                                  <m:dPr>
+                                    <m:ctrlPr>
+                                      <a:rPr lang="fr-FR" i="1">
+                                        <a:solidFill>
+                                          <a:srgbClr val="7030A0"/>
+                                        </a:solidFill>
+                                        <a:latin typeface="Cambria Math" panose="02040503050406030204" pitchFamily="18" charset="0"/>
+                                      </a:rPr>
+                                    </m:ctrlPr>
+                                  </m:dPr>
+                                  <m:e>
+                                    <m:sSub>
+                                      <m:sSubPr>
+                                        <m:ctrlPr>
+                                          <a:rPr lang="fr-FR" i="1">
+                                            <a:solidFill>
+                                              <a:srgbClr val="7030A0"/>
+                                            </a:solidFill>
+                                            <a:latin typeface="Cambria Math" panose="02040503050406030204" pitchFamily="18" charset="0"/>
+                                            <a:ea typeface="Cambria Math" panose="02040503050406030204" pitchFamily="18" charset="0"/>
+                                          </a:rPr>
+                                        </m:ctrlPr>
+                                      </m:sSubPr>
+                                      <m:e>
+                                        <m:r>
+                                          <a:rPr lang="fr-FR" i="1">
+                                            <a:solidFill>
+                                              <a:srgbClr val="7030A0"/>
+                                            </a:solidFill>
+                                            <a:latin typeface="Cambria Math" panose="02040503050406030204" pitchFamily="18" charset="0"/>
+                                            <a:ea typeface="Cambria Math" panose="02040503050406030204" pitchFamily="18" charset="0"/>
+                                          </a:rPr>
+                                          <m:t>𝛽</m:t>
+                                        </m:r>
+                                      </m:e>
+                                      <m:sub>
+                                        <m:r>
+                                          <a:rPr lang="fr-FR" i="1">
+                                            <a:solidFill>
+                                              <a:srgbClr val="7030A0"/>
+                                            </a:solidFill>
+                                            <a:latin typeface="Cambria Math" panose="02040503050406030204" pitchFamily="18" charset="0"/>
+                                            <a:ea typeface="Cambria Math" panose="02040503050406030204" pitchFamily="18" charset="0"/>
+                                          </a:rPr>
+                                          <m:t>𝑖</m:t>
+                                        </m:r>
+                                        <m:r>
+                                          <a:rPr lang="fr-FR" b="0" i="1" smtClean="0">
+                                            <a:solidFill>
+                                              <a:srgbClr val="7030A0"/>
+                                            </a:solidFill>
+                                            <a:latin typeface="Cambria Math" panose="02040503050406030204" pitchFamily="18" charset="0"/>
+                                            <a:ea typeface="Cambria Math" panose="02040503050406030204" pitchFamily="18" charset="0"/>
+                                          </a:rPr>
+                                          <m:t>𝑘</m:t>
+                                        </m:r>
+                                        <m:r>
+                                          <a:rPr lang="fr-FR" b="0" i="1" smtClean="0">
+                                            <a:solidFill>
+                                              <a:srgbClr val="7030A0"/>
+                                            </a:solidFill>
+                                            <a:latin typeface="Cambria Math" panose="02040503050406030204" pitchFamily="18" charset="0"/>
+                                            <a:ea typeface="Cambria Math" panose="02040503050406030204" pitchFamily="18" charset="0"/>
+                                          </a:rPr>
+                                          <m:t>𝑙</m:t>
+                                        </m:r>
+                                      </m:sub>
+                                    </m:sSub>
+                                  </m:e>
+                                </m:d>
+                              </m:e>
+                            </m:func>
+                            <m:r>
+                              <m:rPr>
+                                <m:brk m:alnAt="7"/>
+                              </m:rPr>
+                              <a:rPr lang="fr-FR" b="0" i="1" smtClean="0">
+                                <a:solidFill>
+                                  <a:srgbClr val="7030A0"/>
+                                </a:solidFill>
+                                <a:latin typeface="Cambria Math" panose="02040503050406030204" pitchFamily="18" charset="0"/>
+                                <a:ea typeface="Cambria Math" panose="02040503050406030204" pitchFamily="18" charset="0"/>
+                              </a:rPr>
+                              <m:t>∗</m:t>
+                            </m:r>
+                            <m:r>
+                              <a:rPr lang="fr-FR" b="0" i="1" smtClean="0">
+                                <a:solidFill>
+                                  <a:srgbClr val="7030A0"/>
+                                </a:solidFill>
+                                <a:latin typeface="Cambria Math" panose="02040503050406030204" pitchFamily="18" charset="0"/>
+                                <a:ea typeface="Cambria Math" panose="02040503050406030204" pitchFamily="18" charset="0"/>
+                              </a:rPr>
+                              <m:t>5</m:t>
+                            </m:r>
+                          </m:e>
+                          <m:e>
+                            <m:r>
+                              <a:rPr lang="fr-FR" b="0" i="1" smtClean="0">
+                                <a:solidFill>
+                                  <a:srgbClr val="7030A0"/>
+                                </a:solidFill>
+                                <a:latin typeface="Cambria Math" panose="02040503050406030204" pitchFamily="18" charset="0"/>
+                                <a:ea typeface="Cambria Math" panose="02040503050406030204" pitchFamily="18" charset="0"/>
+                              </a:rPr>
+                              <m:t>+   </m:t>
+                            </m:r>
+                            <m:r>
+                              <a:rPr lang="fr-FR" i="1">
+                                <a:solidFill>
+                                  <a:srgbClr val="7030A0"/>
+                                </a:solidFill>
+                                <a:latin typeface="Cambria Math" panose="02040503050406030204" pitchFamily="18" charset="0"/>
+                              </a:rPr>
+                              <m:t>𝑙</m:t>
+                            </m:r>
+                            <m:func>
+                              <m:funcPr>
+                                <m:ctrlPr>
+                                  <a:rPr lang="fr-FR" i="1">
+                                    <a:solidFill>
+                                      <a:srgbClr val="7030A0"/>
+                                    </a:solidFill>
+                                    <a:latin typeface="Cambria Math" panose="02040503050406030204" pitchFamily="18" charset="0"/>
+                                  </a:rPr>
+                                </m:ctrlPr>
+                              </m:funcPr>
+                              <m:fName>
+                                <m:r>
+                                  <m:rPr>
+                                    <m:sty m:val="p"/>
+                                    <m:brk m:alnAt="7"/>
+                                  </m:rPr>
+                                  <a:rPr lang="fr-FR">
+                                    <a:solidFill>
+                                      <a:srgbClr val="7030A0"/>
+                                    </a:solidFill>
+                                    <a:latin typeface="Cambria Math" panose="02040503050406030204" pitchFamily="18" charset="0"/>
+                                  </a:rPr>
+                                  <m:t>n</m:t>
+                                </m:r>
+                              </m:fName>
+                              <m:e>
+                                <m:d>
+                                  <m:dPr>
+                                    <m:ctrlPr>
+                                      <a:rPr lang="fr-FR" i="1">
+                                        <a:solidFill>
+                                          <a:srgbClr val="7030A0"/>
+                                        </a:solidFill>
+                                        <a:latin typeface="Cambria Math" panose="02040503050406030204" pitchFamily="18" charset="0"/>
+                                      </a:rPr>
+                                    </m:ctrlPr>
+                                  </m:dPr>
+                                  <m:e>
+                                    <m:sSub>
+                                      <m:sSubPr>
+                                        <m:ctrlPr>
+                                          <a:rPr lang="fr-FR" i="1">
+                                            <a:solidFill>
+                                              <a:srgbClr val="7030A0"/>
+                                            </a:solidFill>
+                                            <a:latin typeface="Cambria Math" panose="02040503050406030204" pitchFamily="18" charset="0"/>
+                                            <a:ea typeface="Cambria Math" panose="02040503050406030204" pitchFamily="18" charset="0"/>
+                                          </a:rPr>
+                                        </m:ctrlPr>
+                                      </m:sSubPr>
+                                      <m:e>
+                                        <m:r>
+                                          <a:rPr lang="fr-FR" i="1">
+                                            <a:solidFill>
+                                              <a:srgbClr val="7030A0"/>
+                                            </a:solidFill>
+                                            <a:latin typeface="Cambria Math" panose="02040503050406030204" pitchFamily="18" charset="0"/>
+                                            <a:ea typeface="Cambria Math" panose="02040503050406030204" pitchFamily="18" charset="0"/>
+                                          </a:rPr>
+                                          <m:t>𝛽</m:t>
+                                        </m:r>
+                                      </m:e>
+                                      <m:sub>
+                                        <m:r>
+                                          <a:rPr lang="fr-FR" i="1">
+                                            <a:solidFill>
+                                              <a:srgbClr val="7030A0"/>
+                                            </a:solidFill>
+                                            <a:latin typeface="Cambria Math" panose="02040503050406030204" pitchFamily="18" charset="0"/>
+                                            <a:ea typeface="Cambria Math" panose="02040503050406030204" pitchFamily="18" charset="0"/>
+                                          </a:rPr>
+                                          <m:t>𝑖</m:t>
+                                        </m:r>
+                                        <m:r>
+                                          <a:rPr lang="fr-FR" b="0" i="1" smtClean="0">
+                                            <a:solidFill>
+                                              <a:srgbClr val="7030A0"/>
+                                            </a:solidFill>
+                                            <a:latin typeface="Cambria Math" panose="02040503050406030204" pitchFamily="18" charset="0"/>
+                                            <a:ea typeface="Cambria Math" panose="02040503050406030204" pitchFamily="18" charset="0"/>
+                                          </a:rPr>
+                                          <m:t>𝑘</m:t>
+                                        </m:r>
+                                        <m:r>
+                                          <a:rPr lang="fr-FR" b="0" i="1" smtClean="0">
+                                            <a:solidFill>
+                                              <a:srgbClr val="7030A0"/>
+                                            </a:solidFill>
+                                            <a:latin typeface="Cambria Math" panose="02040503050406030204" pitchFamily="18" charset="0"/>
+                                            <a:ea typeface="Cambria Math" panose="02040503050406030204" pitchFamily="18" charset="0"/>
+                                          </a:rPr>
+                                          <m:t>𝑚</m:t>
+                                        </m:r>
+                                      </m:sub>
+                                    </m:sSub>
+                                  </m:e>
+                                </m:d>
+                              </m:e>
+                            </m:func>
+                            <m:r>
+                              <m:rPr>
+                                <m:brk m:alnAt="7"/>
+                              </m:rPr>
+                              <a:rPr lang="fr-FR" b="0" i="1" smtClean="0">
+                                <a:solidFill>
+                                  <a:srgbClr val="7030A0"/>
+                                </a:solidFill>
+                                <a:latin typeface="Cambria Math" panose="02040503050406030204" pitchFamily="18" charset="0"/>
+                                <a:ea typeface="Cambria Math" panose="02040503050406030204" pitchFamily="18" charset="0"/>
+                              </a:rPr>
+                              <m:t>∗</m:t>
+                            </m:r>
+                            <m:r>
+                              <a:rPr lang="fr-FR" b="0" i="1" smtClean="0">
+                                <a:solidFill>
+                                  <a:srgbClr val="7030A0"/>
+                                </a:solidFill>
+                                <a:latin typeface="Cambria Math" panose="02040503050406030204" pitchFamily="18" charset="0"/>
+                                <a:ea typeface="Cambria Math" panose="02040503050406030204" pitchFamily="18" charset="0"/>
+                              </a:rPr>
+                              <m:t>15</m:t>
+                            </m:r>
+                          </m:e>
+                        </m:mr>
+                      </m:m>
+                    </m:oMath>
+                  </m:oMathPara>
+                </a14:m>
+                <a:endParaRPr lang="fr-FR" sz="1800" b="0" baseline="-25000" dirty="0">
+                  <a:solidFill>
+                    <a:schemeClr val="tx1"/>
+                  </a:solidFill>
+                </a:endParaRPr>
+              </a:p>
+            </p:txBody>
+          </p:sp>
+        </mc:Choice>
+        <mc:Fallback>
+          <p:sp>
+            <p:nvSpPr>
+              <p:cNvPr id="18" name="TextBox 17">
+                <a:extLst>
+                  <a:ext uri="{FF2B5EF4-FFF2-40B4-BE49-F238E27FC236}">
+                    <a16:creationId xmlns:a16="http://schemas.microsoft.com/office/drawing/2014/main" id="{DAC73C58-05AB-A147-8913-71ABCB1EF026}"/>
+                  </a:ext>
+                </a:extLst>
+              </p:cNvPr>
+              <p:cNvSpPr txBox="1">
+                <a:spLocks noRot="1" noChangeAspect="1" noMove="1" noResize="1" noEditPoints="1" noAdjustHandles="1" noChangeArrowheads="1" noChangeShapeType="1" noTextEdit="1"/>
+              </p:cNvSpPr>
+              <p:nvPr/>
+            </p:nvSpPr>
+            <p:spPr>
+              <a:xfrm>
+                <a:off x="7494852" y="5216271"/>
+                <a:ext cx="4398432" cy="1414362"/>
+              </a:xfrm>
+              <a:prstGeom prst="rect">
+                <a:avLst/>
+              </a:prstGeom>
+              <a:blipFill>
+                <a:blip r:embed="rId5"/>
+                <a:stretch>
+                  <a:fillRect b="-3540"/>
+                </a:stretch>
+              </a:blipFill>
+            </p:spPr>
+            <p:txBody>
+              <a:bodyPr/>
+              <a:lstStyle/>
+              <a:p>
+                <a:r>
+                  <a:rPr lang="en-GB">
+                    <a:noFill/>
+                  </a:rPr>
+                  <a:t> </a:t>
+                </a:r>
+              </a:p>
+            </p:txBody>
+          </p:sp>
+        </mc:Fallback>
+      </mc:AlternateContent>
+      <p:sp>
+        <p:nvSpPr>
+          <p:cNvPr id="19" name="TextBox 18">
+            <a:extLst>
+              <a:ext uri="{FF2B5EF4-FFF2-40B4-BE49-F238E27FC236}">
+                <a16:creationId xmlns:a16="http://schemas.microsoft.com/office/drawing/2014/main" id="{A29AE30B-C057-FA41-8FE0-DDBFE250E629}"/>
+              </a:ext>
+            </a:extLst>
+          </p:cNvPr>
+          <p:cNvSpPr txBox="1"/>
+          <p:nvPr/>
+        </p:nvSpPr>
+        <p:spPr>
+          <a:xfrm>
+            <a:off x="4493851" y="5923452"/>
+            <a:ext cx="3365897" cy="369332"/>
+          </a:xfrm>
+          <a:prstGeom prst="rect">
+            <a:avLst/>
+          </a:prstGeom>
+          <a:noFill/>
+        </p:spPr>
+        <p:txBody>
+          <a:bodyPr wrap="square">
+            <a:spAutoFit/>
+          </a:bodyPr>
+          <a:lstStyle/>
+          <a:p>
+            <a:pPr/>
+            <a:r>
+              <a:rPr lang="en-GB" b="1" dirty="0"/>
+              <a:t>HOIs of HTL for focal </a:t>
+            </a:r>
+            <a:r>
+              <a:rPr lang="en-GB" b="1" dirty="0" err="1"/>
+              <a:t>i</a:t>
+            </a:r>
+            <a:r>
+              <a:rPr lang="en-GB" b="1" dirty="0"/>
+              <a:t>, </a:t>
+            </a:r>
+            <a:r>
+              <a:rPr lang="en-GB" b="1" dirty="0" err="1"/>
+              <a:t>obs</a:t>
+            </a:r>
+            <a:r>
+              <a:rPr lang="en-GB" b="1" dirty="0"/>
+              <a:t> 1 =&gt;  </a:t>
+            </a:r>
+          </a:p>
+        </p:txBody>
+      </p:sp>
     </p:spTree>
     <p:extLst>
       <p:ext uri="{BB962C8B-B14F-4D97-AF65-F5344CB8AC3E}">
-        <p14:creationId xmlns:p14="http://schemas.microsoft.com/office/powerpoint/2010/main" val="1111446431"/>
+        <p14:creationId xmlns:p14="http://schemas.microsoft.com/office/powerpoint/2010/main" val="2461710848"/>
       </p:ext>
     </p:extLst>
   </p:cSld>
@@ -8284,7 +11114,112 @@
 </p:sld>
 </file>
 
-<file path=ppt/slides/slide11.xml><?xml version="1.0" encoding="utf-8"?>
+<file path=ppt/slides/slide12.xml><?xml version="1.0" encoding="utf-8"?>
+<p:sld xmlns:a="http://schemas.openxmlformats.org/drawingml/2006/main" xmlns:r="http://schemas.openxmlformats.org/officeDocument/2006/relationships" xmlns:p="http://schemas.openxmlformats.org/presentationml/2006/main">
+  <p:cSld>
+    <p:spTree>
+      <p:nvGrpSpPr>
+        <p:cNvPr id="1" name=""/>
+        <p:cNvGrpSpPr/>
+        <p:nvPr/>
+      </p:nvGrpSpPr>
+      <p:grpSpPr>
+        <a:xfrm>
+          <a:off x="0" y="0"/>
+          <a:ext cx="0" cy="0"/>
+          <a:chOff x="0" y="0"/>
+          <a:chExt cx="0" cy="0"/>
+        </a:xfrm>
+      </p:grpSpPr>
+      <p:sp>
+        <p:nvSpPr>
+          <p:cNvPr id="4" name="Title 1">
+            <a:extLst>
+              <a:ext uri="{FF2B5EF4-FFF2-40B4-BE49-F238E27FC236}">
+                <a16:creationId xmlns:a16="http://schemas.microsoft.com/office/drawing/2014/main" id="{81C7ACA2-4DE1-FF46-B442-BCD502726D9C}"/>
+              </a:ext>
+            </a:extLst>
+          </p:cNvPr>
+          <p:cNvSpPr>
+            <a:spLocks noGrp="1"/>
+          </p:cNvSpPr>
+          <p:nvPr>
+            <p:ph type="title"/>
+          </p:nvPr>
+        </p:nvSpPr>
+        <p:spPr>
+          <a:xfrm>
+            <a:off x="415600" y="54670"/>
+            <a:ext cx="11360800" cy="763600"/>
+          </a:xfrm>
+        </p:spPr>
+        <p:txBody>
+          <a:bodyPr>
+            <a:normAutofit fontScale="90000"/>
+          </a:bodyPr>
+          <a:lstStyle/>
+          <a:p>
+            <a:r>
+              <a:rPr lang="fr-FR" dirty="0"/>
+              <a:t>How to </a:t>
+            </a:r>
+            <a:r>
+              <a:rPr lang="fr-FR" dirty="0" err="1"/>
+              <a:t>add</a:t>
+            </a:r>
+            <a:r>
+              <a:rPr lang="fr-FR" dirty="0"/>
+              <a:t> </a:t>
+            </a:r>
+            <a:r>
+              <a:rPr lang="fr-FR" dirty="0" err="1"/>
+              <a:t>HOIs</a:t>
+            </a:r>
+            <a:r>
+              <a:rPr lang="fr-FR" dirty="0"/>
+              <a:t> for </a:t>
+            </a:r>
+            <a:r>
+              <a:rPr lang="fr-FR" dirty="0" err="1"/>
+              <a:t>higher</a:t>
+            </a:r>
+            <a:r>
+              <a:rPr lang="fr-FR" dirty="0"/>
+              <a:t> </a:t>
+            </a:r>
+            <a:r>
+              <a:rPr lang="fr-FR" dirty="0" err="1"/>
+              <a:t>trophic</a:t>
+            </a:r>
+            <a:r>
+              <a:rPr lang="fr-FR" dirty="0"/>
+              <a:t> </a:t>
+            </a:r>
+            <a:r>
+              <a:rPr lang="fr-FR" dirty="0" err="1"/>
+              <a:t>level</a:t>
+            </a:r>
+            <a:r>
+              <a:rPr lang="fr-FR" dirty="0"/>
+              <a:t> ? </a:t>
+            </a:r>
+          </a:p>
+        </p:txBody>
+      </p:sp>
+    </p:spTree>
+    <p:extLst>
+      <p:ext uri="{BB962C8B-B14F-4D97-AF65-F5344CB8AC3E}">
+        <p14:creationId xmlns:p14="http://schemas.microsoft.com/office/powerpoint/2010/main" val="1547701606"/>
+      </p:ext>
+    </p:extLst>
+  </p:cSld>
+  <p:clrMapOvr>
+    <a:masterClrMapping/>
+  </p:clrMapOvr>
+</p:sld>
+</file>
+
+<file path=ppt/slides/slide13.xml><?xml version="1.0" encoding="utf-8"?>
 <p:sld xmlns:a="http://schemas.openxmlformats.org/drawingml/2006/main" xmlns:r="http://schemas.openxmlformats.org/officeDocument/2006/relationships" xmlns:p="http://schemas.openxmlformats.org/presentationml/2006/main">
   <p:cSld>
     <p:spTree>
@@ -11993,7 +14928,7 @@
 </p:sld>
 </file>
 
-<file path=ppt/slides/slide12.xml><?xml version="1.0" encoding="utf-8"?>
+<file path=ppt/slides/slide14.xml><?xml version="1.0" encoding="utf-8"?>
 <p:sld xmlns:a="http://schemas.openxmlformats.org/drawingml/2006/main" xmlns:r="http://schemas.openxmlformats.org/officeDocument/2006/relationships" xmlns:p="http://schemas.openxmlformats.org/presentationml/2006/main">
   <p:cSld>
     <p:spTree>
@@ -15124,7 +18059,7 @@
 </p:sld>
 </file>
 
-<file path=ppt/slides/slide13.xml><?xml version="1.0" encoding="utf-8"?>
+<file path=ppt/slides/slide15.xml><?xml version="1.0" encoding="utf-8"?>
 <p:sld xmlns:a="http://schemas.openxmlformats.org/drawingml/2006/main" xmlns:r="http://schemas.openxmlformats.org/officeDocument/2006/relationships" xmlns:p="http://schemas.openxmlformats.org/presentationml/2006/main">
   <p:cSld>
     <p:spTree>
@@ -17827,8 +20762,8 @@
           </a:p>
         </p:txBody>
       </p:sp>
-      <mc:AlternateContent xmlns:mc="http://schemas.openxmlformats.org/markup-compatibility/2006">
-        <mc:Choice xmlns:a14="http://schemas.microsoft.com/office/drawing/2010/main" Requires="a14">
+      <mc:AlternateContent xmlns:mc="http://schemas.openxmlformats.org/markup-compatibility/2006" xmlns:a14="http://schemas.microsoft.com/office/drawing/2010/main">
+        <mc:Choice Requires="a14">
           <p:sp>
             <p:nvSpPr>
               <p:cNvPr id="3" name="TextBox 2">
@@ -19054,7 +21989,7 @@
             </p:txBody>
           </p:sp>
         </mc:Choice>
-        <mc:Fallback>
+        <mc:Fallback xmlns="">
           <p:sp>
             <p:nvSpPr>
               <p:cNvPr id="3" name="TextBox 2">
@@ -19168,8 +22103,8 @@
           </a:p>
         </p:txBody>
       </p:sp>
-      <mc:AlternateContent xmlns:mc="http://schemas.openxmlformats.org/markup-compatibility/2006">
-        <mc:Choice xmlns:a14="http://schemas.microsoft.com/office/drawing/2010/main" Requires="a14">
+      <mc:AlternateContent xmlns:mc="http://schemas.openxmlformats.org/markup-compatibility/2006" xmlns:a14="http://schemas.microsoft.com/office/drawing/2010/main">
+        <mc:Choice Requires="a14">
           <p:sp>
             <p:nvSpPr>
               <p:cNvPr id="3" name="TextBox 2">
@@ -20548,7 +23483,17 @@
                                 <a:latin typeface="Cambria Math" panose="02040503050406030204" pitchFamily="18" charset="0"/>
                                 <a:ea typeface="Cambria Math" panose="02040503050406030204" pitchFamily="18" charset="0"/>
                               </a:rPr>
-                              <m:t>∗0</m:t>
+                              <m:t>∗</m:t>
+                            </m:r>
+                            <m:r>
+                              <a:rPr lang="fr-FR" sz="2400" b="0" i="1" smtClean="0">
+                                <a:solidFill>
+                                  <a:schemeClr val="accent2"/>
+                                </a:solidFill>
+                                <a:latin typeface="Cambria Math" panose="02040503050406030204" pitchFamily="18" charset="0"/>
+                                <a:ea typeface="Cambria Math" panose="02040503050406030204" pitchFamily="18" charset="0"/>
+                              </a:rPr>
+                              <m:t>0</m:t>
                             </m:r>
                           </m:e>
                           <m:e>
@@ -20688,7 +23633,17 @@
                                 <a:latin typeface="Cambria Math" panose="02040503050406030204" pitchFamily="18" charset="0"/>
                                 <a:ea typeface="Cambria Math" panose="02040503050406030204" pitchFamily="18" charset="0"/>
                               </a:rPr>
-                              <m:t>∗2</m:t>
+                              <m:t>∗</m:t>
+                            </m:r>
+                            <m:r>
+                              <a:rPr lang="fr-FR" sz="2400" b="0" i="1" smtClean="0">
+                                <a:solidFill>
+                                  <a:schemeClr val="accent2"/>
+                                </a:solidFill>
+                                <a:latin typeface="Cambria Math" panose="02040503050406030204" pitchFamily="18" charset="0"/>
+                                <a:ea typeface="Cambria Math" panose="02040503050406030204" pitchFamily="18" charset="0"/>
+                              </a:rPr>
+                              <m:t>2</m:t>
                             </m:r>
                           </m:e>
                           <m:e>
@@ -20915,7 +23870,7 @@
             </p:txBody>
           </p:sp>
         </mc:Choice>
-        <mc:Fallback>
+        <mc:Fallback xmlns="">
           <p:sp>
             <p:nvSpPr>
               <p:cNvPr id="3" name="TextBox 2">
@@ -21515,8 +24470,8 @@
           </a:p>
         </p:txBody>
       </p:sp>
-      <mc:AlternateContent xmlns:mc="http://schemas.openxmlformats.org/markup-compatibility/2006">
-        <mc:Choice xmlns:a14="http://schemas.microsoft.com/office/drawing/2010/main" Requires="a14">
+      <mc:AlternateContent xmlns:mc="http://schemas.openxmlformats.org/markup-compatibility/2006" xmlns:a14="http://schemas.microsoft.com/office/drawing/2010/main">
+        <mc:Choice Requires="a14">
           <p:sp>
             <p:nvSpPr>
               <p:cNvPr id="6" name="TextBox 5">
@@ -21659,25 +24614,7 @@
                               </a:solidFill>
                               <a:latin typeface="Cambria Math" panose="02040503050406030204" pitchFamily="18" charset="0"/>
                             </a:rPr>
-                            <m:t>[</m:t>
-                          </m:r>
-                          <m:r>
-                            <a:rPr lang="fr-FR" b="0" i="1" smtClean="0">
-                              <a:solidFill>
-                                <a:schemeClr val="accent6"/>
-                              </a:solidFill>
-                              <a:latin typeface="Cambria Math" panose="02040503050406030204" pitchFamily="18" charset="0"/>
-                            </a:rPr>
-                            <m:t> </m:t>
-                          </m:r>
-                          <m:r>
-                            <a:rPr lang="fr-FR" b="0" i="1" smtClean="0">
-                              <a:solidFill>
-                                <a:schemeClr val="accent6"/>
-                              </a:solidFill>
-                              <a:latin typeface="Cambria Math" panose="02040503050406030204" pitchFamily="18" charset="0"/>
-                            </a:rPr>
-                            <m:t>]</m:t>
+                            <m:t>[ ]</m:t>
                           </m:r>
                         </m:e>
                       </m:mr>
@@ -21695,13 +24632,7 @@
                             <a:rPr lang="fr-FR" b="0" i="1" smtClean="0">
                               <a:latin typeface="Cambria Math" panose="02040503050406030204" pitchFamily="18" charset="0"/>
                             </a:rPr>
-                            <m:t> </m:t>
-                          </m:r>
-                          <m:r>
-                            <a:rPr lang="fr-FR" b="0" i="1" smtClean="0">
-                              <a:latin typeface="Cambria Math" panose="02040503050406030204" pitchFamily="18" charset="0"/>
-                            </a:rPr>
-                            <m:t>0</m:t>
+                            <m:t> 0</m:t>
                           </m:r>
                         </m:e>
                         <m:e>
@@ -21730,29 +24661,7 @@
                               </a:solidFill>
                               <a:latin typeface="Cambria Math" panose="02040503050406030204" pitchFamily="18" charset="0"/>
                             </a:rPr>
-                            <m:t>[</m:t>
-                          </m:r>
-                          <m:r>
-                            <a:rPr lang="fr-FR" b="0" i="1" smtClean="0">
-                              <a:solidFill>
-                                <a:schemeClr val="accent6">
-                                  <a:lumMod val="50000"/>
-                                </a:schemeClr>
-                              </a:solidFill>
-                              <a:latin typeface="Cambria Math" panose="02040503050406030204" pitchFamily="18" charset="0"/>
-                            </a:rPr>
-                            <m:t> </m:t>
-                          </m:r>
-                          <m:r>
-                            <a:rPr lang="fr-FR" b="0" i="1" smtClean="0">
-                              <a:solidFill>
-                                <a:schemeClr val="accent6">
-                                  <a:lumMod val="50000"/>
-                                </a:schemeClr>
-                              </a:solidFill>
-                              <a:latin typeface="Cambria Math" panose="02040503050406030204" pitchFamily="18" charset="0"/>
-                            </a:rPr>
-                            <m:t>]</m:t>
+                            <m:t>[ ]</m:t>
                           </m:r>
                         </m:e>
                       </m:mr>
@@ -21770,13 +24679,7 @@
                             <a:rPr lang="fr-FR" b="0" i="1" smtClean="0">
                               <a:latin typeface="Cambria Math" panose="02040503050406030204" pitchFamily="18" charset="0"/>
                             </a:rPr>
-                            <m:t> </m:t>
-                          </m:r>
-                          <m:r>
-                            <a:rPr lang="fr-FR" b="0" i="1" smtClean="0">
-                              <a:latin typeface="Cambria Math" panose="02040503050406030204" pitchFamily="18" charset="0"/>
-                            </a:rPr>
-                            <m:t>0</m:t>
+                            <m:t> 0</m:t>
                           </m:r>
                         </m:e>
                         <m:e>
@@ -21784,13 +24687,7 @@
                             <a:rPr lang="fr-FR" b="0" i="1" smtClean="0">
                               <a:latin typeface="Cambria Math" panose="02040503050406030204" pitchFamily="18" charset="0"/>
                             </a:rPr>
-                            <m:t> </m:t>
-                          </m:r>
-                          <m:r>
-                            <a:rPr lang="fr-FR" b="0" i="1" smtClean="0">
-                              <a:latin typeface="Cambria Math" panose="02040503050406030204" pitchFamily="18" charset="0"/>
-                            </a:rPr>
-                            <m:t>10</m:t>
+                            <m:t> 10</m:t>
                           </m:r>
                         </m:e>
                         <m:e>
@@ -21821,7 +24718,7 @@
             </p:txBody>
           </p:sp>
         </mc:Choice>
-        <mc:Fallback>
+        <mc:Fallback xmlns="">
           <p:sp>
             <p:nvSpPr>
               <p:cNvPr id="6" name="TextBox 5">
@@ -21866,8 +24763,8 @@
           </p:sp>
         </mc:Fallback>
       </mc:AlternateContent>
-      <mc:AlternateContent xmlns:mc="http://schemas.openxmlformats.org/markup-compatibility/2006">
-        <mc:Choice xmlns:a14="http://schemas.microsoft.com/office/drawing/2010/main" Requires="a14">
+      <mc:AlternateContent xmlns:mc="http://schemas.openxmlformats.org/markup-compatibility/2006" xmlns:a14="http://schemas.microsoft.com/office/drawing/2010/main">
+        <mc:Choice Requires="a14">
           <p:sp>
             <p:nvSpPr>
               <p:cNvPr id="8" name="TextBox 7">
@@ -23252,7 +26149,7 @@
             </p:txBody>
           </p:sp>
         </mc:Choice>
-        <mc:Fallback>
+        <mc:Fallback xmlns="">
           <p:sp>
             <p:nvSpPr>
               <p:cNvPr id="8" name="TextBox 7">
@@ -23852,8 +26749,8 @@
           </a:p>
         </p:txBody>
       </p:sp>
-      <mc:AlternateContent xmlns:mc="http://schemas.openxmlformats.org/markup-compatibility/2006">
-        <mc:Choice xmlns:a14="http://schemas.microsoft.com/office/drawing/2010/main" Requires="a14">
+      <mc:AlternateContent xmlns:mc="http://schemas.openxmlformats.org/markup-compatibility/2006" xmlns:a14="http://schemas.microsoft.com/office/drawing/2010/main">
+        <mc:Choice Requires="a14">
           <p:sp>
             <p:nvSpPr>
               <p:cNvPr id="6" name="TextBox 5">
@@ -23996,25 +26893,7 @@
                               </a:solidFill>
                               <a:latin typeface="Cambria Math" panose="02040503050406030204" pitchFamily="18" charset="0"/>
                             </a:rPr>
-                            <m:t>[</m:t>
-                          </m:r>
-                          <m:r>
-                            <a:rPr lang="fr-FR" b="0" i="1" smtClean="0">
-                              <a:solidFill>
-                                <a:schemeClr val="accent6"/>
-                              </a:solidFill>
-                              <a:latin typeface="Cambria Math" panose="02040503050406030204" pitchFamily="18" charset="0"/>
-                            </a:rPr>
-                            <m:t> </m:t>
-                          </m:r>
-                          <m:r>
-                            <a:rPr lang="fr-FR" b="0" i="1" smtClean="0">
-                              <a:solidFill>
-                                <a:schemeClr val="accent6"/>
-                              </a:solidFill>
-                              <a:latin typeface="Cambria Math" panose="02040503050406030204" pitchFamily="18" charset="0"/>
-                            </a:rPr>
-                            <m:t>]</m:t>
+                            <m:t>[ ]</m:t>
                           </m:r>
                         </m:e>
                       </m:mr>
@@ -24032,13 +26911,7 @@
                             <a:rPr lang="fr-FR" b="0" i="1" smtClean="0">
                               <a:latin typeface="Cambria Math" panose="02040503050406030204" pitchFamily="18" charset="0"/>
                             </a:rPr>
-                            <m:t> </m:t>
-                          </m:r>
-                          <m:r>
-                            <a:rPr lang="fr-FR" b="0" i="1" smtClean="0">
-                              <a:latin typeface="Cambria Math" panose="02040503050406030204" pitchFamily="18" charset="0"/>
-                            </a:rPr>
-                            <m:t>0</m:t>
+                            <m:t> 0</m:t>
                           </m:r>
                         </m:e>
                         <m:e>
@@ -24067,29 +26940,7 @@
                               </a:solidFill>
                               <a:latin typeface="Cambria Math" panose="02040503050406030204" pitchFamily="18" charset="0"/>
                             </a:rPr>
-                            <m:t>[</m:t>
-                          </m:r>
-                          <m:r>
-                            <a:rPr lang="fr-FR" b="0" i="1" smtClean="0">
-                              <a:solidFill>
-                                <a:schemeClr val="accent6">
-                                  <a:lumMod val="50000"/>
-                                </a:schemeClr>
-                              </a:solidFill>
-                              <a:latin typeface="Cambria Math" panose="02040503050406030204" pitchFamily="18" charset="0"/>
-                            </a:rPr>
-                            <m:t> </m:t>
-                          </m:r>
-                          <m:r>
-                            <a:rPr lang="fr-FR" b="0" i="1" smtClean="0">
-                              <a:solidFill>
-                                <a:schemeClr val="accent6">
-                                  <a:lumMod val="50000"/>
-                                </a:schemeClr>
-                              </a:solidFill>
-                              <a:latin typeface="Cambria Math" panose="02040503050406030204" pitchFamily="18" charset="0"/>
-                            </a:rPr>
-                            <m:t>]</m:t>
+                            <m:t>[ ]</m:t>
                           </m:r>
                         </m:e>
                       </m:mr>
@@ -24107,13 +26958,7 @@
                             <a:rPr lang="fr-FR" b="0" i="1" smtClean="0">
                               <a:latin typeface="Cambria Math" panose="02040503050406030204" pitchFamily="18" charset="0"/>
                             </a:rPr>
-                            <m:t> </m:t>
-                          </m:r>
-                          <m:r>
-                            <a:rPr lang="fr-FR" b="0" i="1" smtClean="0">
-                              <a:latin typeface="Cambria Math" panose="02040503050406030204" pitchFamily="18" charset="0"/>
-                            </a:rPr>
-                            <m:t>0</m:t>
+                            <m:t> 0</m:t>
                           </m:r>
                         </m:e>
                         <m:e>
@@ -24121,13 +26966,7 @@
                             <a:rPr lang="fr-FR" b="0" i="1" smtClean="0">
                               <a:latin typeface="Cambria Math" panose="02040503050406030204" pitchFamily="18" charset="0"/>
                             </a:rPr>
-                            <m:t> </m:t>
-                          </m:r>
-                          <m:r>
-                            <a:rPr lang="fr-FR" b="0" i="1" smtClean="0">
-                              <a:latin typeface="Cambria Math" panose="02040503050406030204" pitchFamily="18" charset="0"/>
-                            </a:rPr>
-                            <m:t>10</m:t>
+                            <m:t> 10</m:t>
                           </m:r>
                         </m:e>
                         <m:e>
@@ -24433,7 +27272,7 @@
             </p:txBody>
           </p:sp>
         </mc:Choice>
-        <mc:Fallback>
+        <mc:Fallback xmlns="">
           <p:sp>
             <p:nvSpPr>
               <p:cNvPr id="6" name="TextBox 5">
@@ -24478,8 +27317,8 @@
           </p:sp>
         </mc:Fallback>
       </mc:AlternateContent>
-      <mc:AlternateContent xmlns:mc="http://schemas.openxmlformats.org/markup-compatibility/2006">
-        <mc:Choice xmlns:a14="http://schemas.microsoft.com/office/drawing/2010/main" Requires="a14">
+      <mc:AlternateContent xmlns:mc="http://schemas.openxmlformats.org/markup-compatibility/2006" xmlns:a14="http://schemas.microsoft.com/office/drawing/2010/main">
+        <mc:Choice Requires="a14">
           <p:sp>
             <p:nvSpPr>
               <p:cNvPr id="8" name="TextBox 7">
@@ -25864,7 +28703,7 @@
             </p:txBody>
           </p:sp>
         </mc:Choice>
-        <mc:Fallback>
+        <mc:Fallback xmlns="">
           <p:sp>
             <p:nvSpPr>
               <p:cNvPr id="8" name="TextBox 7">

</xml_diff>